<commit_message>
Updated 4th set of lecture slides
</commit_message>
<xml_diff>
--- a/slides/Lecture4.pptx
+++ b/slides/Lecture4.pptx
@@ -5,18 +5,20 @@
     <p:sldMasterId id="2147483693" r:id="rId1"/>
   </p:sldMasterIdLst>
   <p:notesMasterIdLst>
-    <p:notesMasterId r:id="rId8"/>
+    <p:notesMasterId r:id="rId10"/>
   </p:notesMasterIdLst>
   <p:handoutMasterIdLst>
-    <p:handoutMasterId r:id="rId9"/>
+    <p:handoutMasterId r:id="rId11"/>
   </p:handoutMasterIdLst>
   <p:sldIdLst>
     <p:sldId id="393" r:id="rId2"/>
     <p:sldId id="414" r:id="rId3"/>
-    <p:sldId id="415" r:id="rId4"/>
-    <p:sldId id="416" r:id="rId5"/>
-    <p:sldId id="417" r:id="rId6"/>
-    <p:sldId id="418" r:id="rId7"/>
+    <p:sldId id="419" r:id="rId4"/>
+    <p:sldId id="420" r:id="rId5"/>
+    <p:sldId id="415" r:id="rId6"/>
+    <p:sldId id="421" r:id="rId7"/>
+    <p:sldId id="422" r:id="rId8"/>
+    <p:sldId id="423" r:id="rId9"/>
   </p:sldIdLst>
   <p:sldSz cx="9144000" cy="6858000" type="screen4x3"/>
   <p:notesSz cx="6858000" cy="9144000"/>
@@ -723,7 +725,7 @@
             </a:extLst>
           </p:cNvPr>
           <p:cNvSpPr>
-            <a:spLocks noRot="1" noChangeArrowheads="1" noTextEdit="1"/>
+            <a:spLocks noGrp="1" noRot="1" noChangeAspect="1" noChangeArrowheads="1" noTextEdit="1"/>
           </p:cNvSpPr>
           <p:nvPr>
             <p:ph type="sldImg" idx="2"/>
@@ -1157,6 +1159,91 @@
     </a:lvl9pPr>
   </p:notesStyle>
 </p:notesMaster>
+</file>
+
+<file path=ppt/notesSlides/notesSlide1.xml><?xml version="1.0" encoding="utf-8"?>
+<p:notes xmlns:a="http://schemas.openxmlformats.org/drawingml/2006/main" xmlns:r="http://schemas.openxmlformats.org/officeDocument/2006/relationships" xmlns:p="http://schemas.openxmlformats.org/presentationml/2006/main">
+  <p:cSld>
+    <p:spTree>
+      <p:nvGrpSpPr>
+        <p:cNvPr id="1" name=""/>
+        <p:cNvGrpSpPr/>
+        <p:nvPr/>
+      </p:nvGrpSpPr>
+      <p:grpSpPr>
+        <a:xfrm>
+          <a:off x="0" y="0"/>
+          <a:ext cx="0" cy="0"/>
+          <a:chOff x="0" y="0"/>
+          <a:chExt cx="0" cy="0"/>
+        </a:xfrm>
+      </p:grpSpPr>
+      <p:sp>
+        <p:nvSpPr>
+          <p:cNvPr id="2" name="Slide Image Placeholder 1"/>
+          <p:cNvSpPr>
+            <a:spLocks noGrp="1" noRot="1" noChangeAspect="1"/>
+          </p:cNvSpPr>
+          <p:nvPr>
+            <p:ph type="sldImg"/>
+          </p:nvPr>
+        </p:nvSpPr>
+        <p:spPr/>
+      </p:sp>
+      <p:sp>
+        <p:nvSpPr>
+          <p:cNvPr id="3" name="Notes Placeholder 2"/>
+          <p:cNvSpPr>
+            <a:spLocks noGrp="1"/>
+          </p:cNvSpPr>
+          <p:nvPr>
+            <p:ph type="body" idx="1"/>
+          </p:nvPr>
+        </p:nvSpPr>
+        <p:spPr/>
+        <p:txBody>
+          <a:bodyPr/>
+          <a:lstStyle/>
+          <a:p>
+            <a:endParaRPr lang="en-US" dirty="0"/>
+          </a:p>
+        </p:txBody>
+      </p:sp>
+      <p:sp>
+        <p:nvSpPr>
+          <p:cNvPr id="4" name="Slide Number Placeholder 3"/>
+          <p:cNvSpPr>
+            <a:spLocks noGrp="1"/>
+          </p:cNvSpPr>
+          <p:nvPr>
+            <p:ph type="sldNum" sz="quarter" idx="10"/>
+          </p:nvPr>
+        </p:nvSpPr>
+        <p:spPr/>
+        <p:txBody>
+          <a:bodyPr/>
+          <a:lstStyle/>
+          <a:p>
+            <a:fld id="{77ABEA3E-A44E-4280-8076-9D3B43166F06}" type="slidenum">
+              <a:rPr lang="en-US" altLang="en-US" smtClean="0"/>
+              <a:pPr/>
+              <a:t>8</a:t>
+            </a:fld>
+            <a:endParaRPr lang="en-US" altLang="en-US"/>
+          </a:p>
+        </p:txBody>
+      </p:sp>
+    </p:spTree>
+    <p:extLst>
+      <p:ext uri="{BB962C8B-B14F-4D97-AF65-F5344CB8AC3E}">
+        <p14:creationId xmlns:p14="http://schemas.microsoft.com/office/powerpoint/2010/main" val="1914121108"/>
+      </p:ext>
+    </p:extLst>
+  </p:cSld>
+  <p:clrMapOvr>
+    <a:masterClrMapping/>
+  </p:clrMapOvr>
+</p:notes>
 </file>
 
 <file path=ppt/slideLayouts/slideLayout1.xml><?xml version="1.0" encoding="utf-8"?>
@@ -15648,9 +15735,10 @@
           <a:p>
             <a:pPr algn="l"/>
             <a:r>
-              <a:rPr lang="en-US" altLang="en-US" dirty="0"/>
-              <a:t>GUI-based Java Apps</a:t>
+              <a:rPr lang="en-US" altLang="en-US" dirty="0" smtClean="0"/>
+              <a:t>Design Patterns</a:t>
             </a:r>
+            <a:endParaRPr lang="en-US" altLang="en-US" dirty="0"/>
           </a:p>
         </p:txBody>
       </p:sp>
@@ -15707,9 +15795,10 @@
           <a:lstStyle/>
           <a:p>
             <a:r>
-              <a:rPr lang="en-US" altLang="en-US" dirty="0"/>
-              <a:t>GUI Components</a:t>
+              <a:rPr lang="en-US" altLang="en-US" dirty="0" smtClean="0"/>
+              <a:t>Design Patterns: introduction</a:t>
             </a:r>
+            <a:endParaRPr lang="en-US" altLang="en-US" dirty="0"/>
           </a:p>
         </p:txBody>
       </p:sp>
@@ -15746,8 +15835,30 @@
               </a:spcBef>
             </a:pPr>
             <a:r>
-              <a:rPr lang="en-US" altLang="en-US" dirty="0"/>
-              <a:t>Let us examine some Java applications </a:t>
+              <a:rPr lang="en-US" altLang="en-US" dirty="0" smtClean="0"/>
+              <a:t>They </a:t>
+            </a:r>
+          </a:p>
+          <a:p>
+            <a:pPr lvl="1">
+              <a:spcBef>
+                <a:spcPct val="70000"/>
+              </a:spcBef>
+            </a:pPr>
+            <a:r>
+              <a:rPr lang="en-US" altLang="en-US" dirty="0" smtClean="0"/>
+              <a:t>are elegant solutions</a:t>
+            </a:r>
+          </a:p>
+          <a:p>
+            <a:pPr lvl="2">
+              <a:spcBef>
+                <a:spcPct val="70000"/>
+              </a:spcBef>
+            </a:pPr>
+            <a:r>
+              <a:rPr lang="en-US" altLang="en-US" dirty="0" smtClean="0"/>
+              <a:t>To well known problems in software design</a:t>
             </a:r>
           </a:p>
           <a:p>
@@ -15758,7 +15869,22 @@
             </a:pPr>
             <a:r>
               <a:rPr lang="en-US" altLang="en-US" dirty="0"/>
-              <a:t>That have graphical components</a:t>
+              <a:t>s</a:t>
+            </a:r>
+            <a:r>
+              <a:rPr lang="en-US" altLang="en-US" dirty="0" smtClean="0"/>
+              <a:t>pecify the way classes</a:t>
+            </a:r>
+          </a:p>
+          <a:p>
+            <a:pPr lvl="2">
+              <a:spcBef>
+                <a:spcPct val="70000"/>
+              </a:spcBef>
+            </a:pPr>
+            <a:r>
+              <a:rPr lang="en-US" altLang="en-US" dirty="0" smtClean="0"/>
+              <a:t>should be structured and</a:t>
             </a:r>
           </a:p>
           <a:p>
@@ -15769,18 +15895,11 @@
             </a:pPr>
             <a:r>
               <a:rPr lang="en-US" altLang="en-US" dirty="0"/>
-              <a:t>Which are at the heart of Graphical User Interfaces (GUI)</a:t>
+              <a:t>s</a:t>
             </a:r>
-          </a:p>
-          <a:p>
-            <a:pPr>
-              <a:spcBef>
-                <a:spcPct val="70000"/>
-              </a:spcBef>
-            </a:pPr>
             <a:r>
-              <a:rPr lang="en-US" altLang="en-US" dirty="0"/>
-              <a:t>A GUI component is an object</a:t>
+              <a:rPr lang="en-US" altLang="en-US" dirty="0" smtClean="0"/>
+              <a:t>hould talk to one another </a:t>
             </a:r>
           </a:p>
           <a:p>
@@ -15791,41 +15910,35 @@
             </a:pPr>
             <a:r>
               <a:rPr lang="en-US" altLang="en-US" dirty="0"/>
-              <a:t>Representing a screen element such as a button</a:t>
+              <a:t>w</a:t>
+            </a:r>
+            <a:r>
+              <a:rPr lang="en-US" altLang="en-US" dirty="0" smtClean="0"/>
+              <a:t>ere introduced in the book titled</a:t>
             </a:r>
           </a:p>
           <a:p>
-            <a:pPr>
+            <a:pPr lvl="2">
               <a:spcBef>
                 <a:spcPct val="70000"/>
               </a:spcBef>
             </a:pPr>
             <a:r>
               <a:rPr lang="en-US" altLang="en-US" dirty="0"/>
-              <a:t>Abstract Windowing Toolkit and Swing</a:t>
+              <a:t>Design Patterns: Elements of Reusable Object-Oriented Software</a:t>
             </a:r>
           </a:p>
           <a:p>
-            <a:pPr lvl="1">
+            <a:pPr lvl="2">
               <a:spcBef>
                 <a:spcPct val="70000"/>
               </a:spcBef>
             </a:pPr>
             <a:r>
-              <a:rPr lang="en-US" altLang="en-US" dirty="0"/>
-              <a:t>Were the original Java GUI packages</a:t>
+              <a:rPr lang="en-US" altLang="en-US" dirty="0" smtClean="0"/>
+              <a:t>By the Gang of Four (GoF)</a:t>
             </a:r>
-          </a:p>
-          <a:p>
-            <a:pPr lvl="1">
-              <a:spcBef>
-                <a:spcPct val="70000"/>
-              </a:spcBef>
-            </a:pPr>
-            <a:r>
-              <a:rPr lang="en-US" altLang="en-US" dirty="0"/>
-              <a:t>Both will be used to create our GUI-based Java Apps</a:t>
-            </a:r>
+            <a:endParaRPr lang="en-US" altLang="en-US" dirty="0"/>
           </a:p>
         </p:txBody>
       </p:sp>
@@ -15883,9 +15996,10 @@
           <a:lstStyle/>
           <a:p>
             <a:r>
-              <a:rPr lang="en-US" altLang="en-US" dirty="0"/>
-              <a:t>GUI containers</a:t>
+              <a:rPr lang="en-US" altLang="en-US" dirty="0" smtClean="0"/>
+              <a:t>Design Patterns: categories</a:t>
             </a:r>
+            <a:endParaRPr lang="en-US" altLang="en-US" dirty="0"/>
           </a:p>
         </p:txBody>
       </p:sp>
@@ -15922,8 +16036,8 @@
               </a:spcBef>
             </a:pPr>
             <a:r>
-              <a:rPr lang="en-US" altLang="en-US" dirty="0"/>
-              <a:t>A container</a:t>
+              <a:rPr lang="en-US" altLang="en-US" dirty="0" smtClean="0"/>
+              <a:t>Design patterns can be categorized as</a:t>
             </a:r>
           </a:p>
           <a:p>
@@ -15933,27 +16047,8 @@
               </a:spcBef>
             </a:pPr>
             <a:r>
-              <a:rPr lang="en-US" altLang="en-US" dirty="0"/>
-              <a:t>Is a component used to hold and organize other component</a:t>
-            </a:r>
-          </a:p>
-          <a:p>
-            <a:pPr lvl="1">
-              <a:spcBef>
-                <a:spcPct val="70000"/>
-              </a:spcBef>
-            </a:pPr>
-            <a:endParaRPr lang="en-US" altLang="en-US" dirty="0"/>
-          </a:p>
-          <a:p>
-            <a:pPr lvl="1">
-              <a:spcBef>
-                <a:spcPct val="70000"/>
-              </a:spcBef>
-            </a:pPr>
-            <a:r>
-              <a:rPr lang="en-US" altLang="en-US" dirty="0"/>
-              <a:t>A frame is an example of a heavy-weight container</a:t>
+              <a:rPr lang="en-US" altLang="en-US" dirty="0" smtClean="0"/>
+              <a:t>Creational</a:t>
             </a:r>
           </a:p>
           <a:p>
@@ -15964,8 +16059,13 @@
             </a:pPr>
             <a:r>
               <a:rPr lang="en-US" altLang="en-US" dirty="0"/>
-              <a:t>It is displayed as a separate window with a title bar</a:t>
+              <a:t>c</a:t>
             </a:r>
+            <a:r>
+              <a:rPr lang="en-US" altLang="en-US" dirty="0" smtClean="0"/>
+              <a:t>oncerned with how to create objects</a:t>
+            </a:r>
+            <a:endParaRPr lang="en-US" altLang="en-US" dirty="0"/>
           </a:p>
           <a:p>
             <a:pPr lvl="1">
@@ -15974,8 +16074,8 @@
               </a:spcBef>
             </a:pPr>
             <a:r>
-              <a:rPr lang="en-US" altLang="en-US" dirty="0"/>
-              <a:t>A panel is an example of a light-weight container</a:t>
+              <a:rPr lang="en-US" altLang="en-US" dirty="0" smtClean="0"/>
+              <a:t>Structural</a:t>
             </a:r>
           </a:p>
           <a:p>
@@ -15985,8 +16085,20 @@
               </a:spcBef>
             </a:pPr>
             <a:r>
-              <a:rPr lang="en-US" altLang="en-US" dirty="0"/>
-              <a:t>That cannot be displayed on its own </a:t>
+              <a:rPr lang="en-US" altLang="en-US" dirty="0" smtClean="0"/>
+              <a:t>deals with the relationship between classes</a:t>
+            </a:r>
+            <a:endParaRPr lang="en-US" altLang="en-US" dirty="0"/>
+          </a:p>
+          <a:p>
+            <a:pPr lvl="1">
+              <a:spcBef>
+                <a:spcPct val="70000"/>
+              </a:spcBef>
+            </a:pPr>
+            <a:r>
+              <a:rPr lang="en-US" altLang="en-US" dirty="0" smtClean="0"/>
+              <a:t>Behavioral</a:t>
             </a:r>
           </a:p>
           <a:p>
@@ -15996,16 +16108,17 @@
               </a:spcBef>
             </a:pPr>
             <a:r>
-              <a:rPr lang="en-US" altLang="en-US" dirty="0"/>
-              <a:t>As such, it must be added to another container to be displayed</a:t>
+              <a:rPr lang="en-US" altLang="en-US" dirty="0" smtClean="0"/>
+              <a:t>d</a:t>
             </a:r>
-          </a:p>
-          <a:p>
-            <a:pPr lvl="2">
-              <a:spcBef>
-                <a:spcPct val="70000"/>
-              </a:spcBef>
-            </a:pPr>
+            <a:r>
+              <a:rPr lang="en-US" altLang="en-US" dirty="0" smtClean="0"/>
+              <a:t>efines the way objects should interact with </a:t>
+            </a:r>
+            <a:r>
+              <a:rPr lang="en-US" altLang="en-US" smtClean="0"/>
+              <a:t>one another </a:t>
+            </a:r>
             <a:endParaRPr lang="en-US" altLang="en-US" dirty="0"/>
           </a:p>
         </p:txBody>
@@ -16013,7 +16126,7 @@
     </p:spTree>
     <p:extLst>
       <p:ext uri="{BB962C8B-B14F-4D97-AF65-F5344CB8AC3E}">
-        <p14:creationId xmlns:p14="http://schemas.microsoft.com/office/powerpoint/2010/main" val="1755264352"/>
+        <p14:creationId xmlns:p14="http://schemas.microsoft.com/office/powerpoint/2010/main" val="224308012"/>
       </p:ext>
     </p:extLst>
   </p:cSld>
@@ -16069,13 +16182,10 @@
           <a:lstStyle/>
           <a:p>
             <a:r>
-              <a:rPr lang="en-US" altLang="en-US" dirty="0" err="1"/>
-              <a:t>PushCounter</a:t>
+              <a:rPr lang="en-US" altLang="en-US" dirty="0" smtClean="0"/>
+              <a:t>Design Patterns: benefits</a:t>
             </a:r>
-            <a:r>
-              <a:rPr lang="en-US" altLang="en-US" dirty="0"/>
-              <a:t> Application</a:t>
-            </a:r>
+            <a:endParaRPr lang="en-US" altLang="en-US" dirty="0"/>
           </a:p>
         </p:txBody>
       </p:sp>
@@ -16112,16 +16222,8 @@
               </a:spcBef>
             </a:pPr>
             <a:r>
-              <a:rPr lang="en-US" altLang="en-US" dirty="0"/>
-              <a:t>The </a:t>
-            </a:r>
-            <a:r>
-              <a:rPr lang="en-US" altLang="en-US" dirty="0" err="1"/>
-              <a:t>PushCounter</a:t>
-            </a:r>
-            <a:r>
-              <a:rPr lang="en-US" altLang="en-US" dirty="0"/>
-              <a:t> application </a:t>
+              <a:rPr lang="en-US" altLang="en-US" dirty="0" smtClean="0"/>
+              <a:t>Benefits</a:t>
             </a:r>
           </a:p>
           <a:p>
@@ -16131,8 +16233,8 @@
               </a:spcBef>
             </a:pPr>
             <a:r>
-              <a:rPr lang="en-US" altLang="en-US" dirty="0"/>
-              <a:t>Displays a push button that increments a counter </a:t>
+              <a:rPr lang="en-US" altLang="en-US" dirty="0" smtClean="0"/>
+              <a:t>They enable you </a:t>
             </a:r>
           </a:p>
           <a:p>
@@ -16142,8 +16244,8 @@
               </a:spcBef>
             </a:pPr>
             <a:r>
-              <a:rPr lang="en-US" altLang="en-US" dirty="0"/>
-              <a:t>Each time it is pushed</a:t>
+              <a:rPr lang="en-US" altLang="en-US" dirty="0" smtClean="0"/>
+              <a:t>to discuss projects at an abstract level</a:t>
             </a:r>
           </a:p>
           <a:p>
@@ -16152,9 +16254,17 @@
                 <a:spcPct val="70000"/>
               </a:spcBef>
             </a:pPr>
+            <a:endParaRPr lang="en-US" altLang="en-US" dirty="0" smtClean="0"/>
+          </a:p>
+          <a:p>
+            <a:pPr lvl="1">
+              <a:spcBef>
+                <a:spcPct val="70000"/>
+              </a:spcBef>
+            </a:pPr>
             <a:r>
-              <a:rPr lang="en-US" altLang="en-US" dirty="0"/>
-              <a:t>Consists of a</a:t>
+              <a:rPr lang="en-US" altLang="en-US" dirty="0" smtClean="0"/>
+              <a:t>They make it possible to</a:t>
             </a:r>
           </a:p>
           <a:p>
@@ -16164,41 +16274,8 @@
               </a:spcBef>
             </a:pPr>
             <a:r>
-              <a:rPr lang="en-US" altLang="en-US" dirty="0"/>
-              <a:t>Label</a:t>
-            </a:r>
-          </a:p>
-          <a:p>
-            <a:pPr lvl="3">
-              <a:spcBef>
-                <a:spcPct val="70000"/>
-              </a:spcBef>
-            </a:pPr>
-            <a:r>
-              <a:rPr lang="en-US" altLang="en-US" dirty="0"/>
-              <a:t>A GUI component that displays a line of text</a:t>
-            </a:r>
-          </a:p>
-          <a:p>
-            <a:pPr lvl="2">
-              <a:spcBef>
-                <a:spcPct val="70000"/>
-              </a:spcBef>
-            </a:pPr>
-            <a:r>
-              <a:rPr lang="en-US" altLang="en-US" dirty="0"/>
-              <a:t>Button</a:t>
-            </a:r>
-          </a:p>
-          <a:p>
-            <a:pPr lvl="3">
-              <a:spcBef>
-                <a:spcPct val="70000"/>
-              </a:spcBef>
-            </a:pPr>
-            <a:r>
-              <a:rPr lang="en-US" altLang="en-US" dirty="0"/>
-              <a:t>A GUI component that allows the user to initiate an action event</a:t>
+              <a:rPr lang="en-US" altLang="en-US" dirty="0" smtClean="0"/>
+              <a:t>Create reusable, maintainable and extensible code</a:t>
             </a:r>
           </a:p>
           <a:p>
@@ -16207,25 +16284,38 @@
                 <a:spcPct val="70000"/>
               </a:spcBef>
             </a:pPr>
+            <a:endParaRPr lang="en-US" altLang="en-US" dirty="0" smtClean="0"/>
+          </a:p>
+          <a:p>
+            <a:pPr lvl="1">
+              <a:spcBef>
+                <a:spcPct val="70000"/>
+              </a:spcBef>
+            </a:pPr>
             <a:r>
-              <a:rPr lang="en-US" altLang="en-US" dirty="0"/>
-              <a:t>Refer to </a:t>
+              <a:rPr lang="en-US" altLang="en-US" dirty="0" smtClean="0"/>
+              <a:t>They make it easier to switch to new development frameworks</a:t>
             </a:r>
+          </a:p>
+          <a:p>
+            <a:pPr marL="693737" lvl="2" indent="0">
+              <a:spcBef>
+                <a:spcPct val="70000"/>
+              </a:spcBef>
+              <a:buNone/>
+            </a:pPr>
             <a:r>
-              <a:rPr lang="en-US" altLang="en-US" b="1" dirty="0" err="1"/>
-              <a:t>PushCounterApp</a:t>
+              <a:rPr lang="en-US" altLang="en-US" dirty="0" smtClean="0"/>
+              <a:t> </a:t>
             </a:r>
-            <a:r>
-              <a:rPr lang="en-US" altLang="en-US" dirty="0"/>
-              <a:t> Eclipse project</a:t>
-            </a:r>
+            <a:endParaRPr lang="en-US" altLang="en-US" dirty="0"/>
           </a:p>
         </p:txBody>
       </p:sp>
     </p:spTree>
     <p:extLst>
       <p:ext uri="{BB962C8B-B14F-4D97-AF65-F5344CB8AC3E}">
-        <p14:creationId xmlns:p14="http://schemas.microsoft.com/office/powerpoint/2010/main" val="736004771"/>
+        <p14:creationId xmlns:p14="http://schemas.microsoft.com/office/powerpoint/2010/main" val="3341701026"/>
       </p:ext>
     </p:extLst>
   </p:cSld>
@@ -16281,21 +16371,10 @@
           <a:lstStyle/>
           <a:p>
             <a:r>
-              <a:rPr lang="en-US" altLang="en-US" dirty="0" err="1"/>
-              <a:t>PushCounter</a:t>
+              <a:rPr lang="en-US" altLang="en-US" dirty="0" smtClean="0"/>
+              <a:t>Memento Pattern: introduction</a:t>
             </a:r>
-            <a:r>
-              <a:rPr lang="en-US" altLang="en-US" dirty="0"/>
-              <a:t> Application (</a:t>
-            </a:r>
-            <a:r>
-              <a:rPr lang="en-US" altLang="en-US" dirty="0" err="1"/>
-              <a:t>ctd</a:t>
-            </a:r>
-            <a:r>
-              <a:rPr lang="en-US" altLang="en-US" dirty="0"/>
-              <a:t>)</a:t>
-            </a:r>
+            <a:endParaRPr lang="en-US" altLang="en-US" dirty="0"/>
           </a:p>
         </p:txBody>
       </p:sp>
@@ -16317,7 +16396,7 @@
         </p:nvSpPr>
         <p:spPr>
           <a:xfrm>
-            <a:off x="0" y="1371600"/>
+            <a:off x="0" y="1600200"/>
             <a:ext cx="9144000" cy="5257799"/>
           </a:xfrm>
           <a:noFill/>
@@ -16332,8 +16411,8 @@
               </a:spcBef>
             </a:pPr>
             <a:r>
-              <a:rPr lang="en-US" altLang="en-US" dirty="0"/>
-              <a:t>A listener is used in the application</a:t>
+              <a:rPr lang="en-US" altLang="en-US" dirty="0" smtClean="0"/>
+              <a:t>It:</a:t>
             </a:r>
           </a:p>
           <a:p>
@@ -16344,8 +16423,55 @@
             </a:pPr>
             <a:r>
               <a:rPr lang="en-US" altLang="en-US" dirty="0"/>
-              <a:t>To react to the event generated by the button</a:t>
+              <a:t>i</a:t>
             </a:r>
+            <a:r>
+              <a:rPr lang="en-US" altLang="en-US" dirty="0" smtClean="0"/>
+              <a:t>s an example of a behavioral design pattern</a:t>
+            </a:r>
+          </a:p>
+          <a:p>
+            <a:pPr lvl="1">
+              <a:spcBef>
+                <a:spcPct val="70000"/>
+              </a:spcBef>
+            </a:pPr>
+            <a:endParaRPr lang="en-US" altLang="en-US" dirty="0"/>
+          </a:p>
+          <a:p>
+            <a:pPr lvl="1">
+              <a:spcBef>
+                <a:spcPct val="70000"/>
+              </a:spcBef>
+            </a:pPr>
+            <a:r>
+              <a:rPr lang="en-US" altLang="en-US" dirty="0"/>
+              <a:t>u</a:t>
+            </a:r>
+            <a:r>
+              <a:rPr lang="en-US" altLang="en-US" dirty="0" smtClean="0"/>
+              <a:t>sed to implement undo mechanisms</a:t>
+            </a:r>
+          </a:p>
+          <a:p>
+            <a:pPr lvl="2">
+              <a:spcBef>
+                <a:spcPct val="70000"/>
+              </a:spcBef>
+            </a:pPr>
+            <a:r>
+              <a:rPr lang="en-US" altLang="en-US" dirty="0" smtClean="0"/>
+              <a:t>To help restore an object to a previous state</a:t>
+            </a:r>
+            <a:endParaRPr lang="en-US" altLang="en-US" dirty="0"/>
+          </a:p>
+          <a:p>
+            <a:pPr lvl="2">
+              <a:spcBef>
+                <a:spcPct val="70000"/>
+              </a:spcBef>
+            </a:pPr>
+            <a:endParaRPr lang="en-US" altLang="en-US" dirty="0"/>
           </a:p>
           <a:p>
             <a:pPr>
@@ -16354,8 +16480,8 @@
               </a:spcBef>
             </a:pPr>
             <a:r>
-              <a:rPr lang="en-US" altLang="en-US" dirty="0"/>
-              <a:t>The listener can be implemented</a:t>
+              <a:rPr lang="en-US" altLang="en-US" dirty="0" smtClean="0"/>
+              <a:t>Case study:</a:t>
             </a:r>
           </a:p>
           <a:p>
@@ -16365,93 +16491,17 @@
               </a:spcBef>
             </a:pPr>
             <a:r>
-              <a:rPr lang="en-US" altLang="en-US" dirty="0"/>
-              <a:t>as an inner class </a:t>
+              <a:rPr lang="en-US" altLang="en-US" dirty="0" smtClean="0"/>
+              <a:t>Equip an editor with an undo mechanism</a:t>
             </a:r>
-          </a:p>
-          <a:p>
-            <a:pPr lvl="2">
-              <a:spcBef>
-                <a:spcPct val="70000"/>
-              </a:spcBef>
-            </a:pPr>
-            <a:r>
-              <a:rPr lang="en-US" altLang="en-US" dirty="0"/>
-              <a:t>That implements the </a:t>
-            </a:r>
-            <a:r>
-              <a:rPr lang="en-US" altLang="en-US" dirty="0">
-                <a:latin typeface="Courier New" panose="02070309020205020404" pitchFamily="49" charset="0"/>
-                <a:cs typeface="Courier New" panose="02070309020205020404" pitchFamily="49" charset="0"/>
-              </a:rPr>
-              <a:t>ActionListener</a:t>
-            </a:r>
-            <a:r>
-              <a:rPr lang="en-US" altLang="en-US" dirty="0"/>
-              <a:t> interface</a:t>
-            </a:r>
-          </a:p>
-          <a:p>
-            <a:pPr lvl="1">
-              <a:spcBef>
-                <a:spcPct val="70000"/>
-              </a:spcBef>
-            </a:pPr>
-            <a:r>
-              <a:rPr lang="en-US" altLang="en-US" dirty="0"/>
-              <a:t>Or as an anonymous inner type</a:t>
-            </a:r>
-          </a:p>
-          <a:p>
-            <a:pPr>
-              <a:spcBef>
-                <a:spcPct val="70000"/>
-              </a:spcBef>
-            </a:pPr>
-            <a:r>
-              <a:rPr lang="en-US" altLang="en-US" dirty="0"/>
-              <a:t>When the user presses the button</a:t>
-            </a:r>
-          </a:p>
-          <a:p>
-            <a:pPr lvl="1">
-              <a:spcBef>
-                <a:spcPct val="70000"/>
-              </a:spcBef>
-            </a:pPr>
-            <a:r>
-              <a:rPr lang="en-US" altLang="en-US" dirty="0"/>
-              <a:t>An action event object is created and </a:t>
-            </a:r>
-          </a:p>
-          <a:p>
-            <a:pPr lvl="2">
-              <a:spcBef>
-                <a:spcPct val="70000"/>
-              </a:spcBef>
-            </a:pPr>
-            <a:r>
-              <a:rPr lang="en-US" altLang="en-US" dirty="0"/>
-              <a:t>Calls the </a:t>
-            </a:r>
-            <a:r>
-              <a:rPr lang="en-US" altLang="en-US" dirty="0" err="1">
-                <a:latin typeface="Courier New" panose="02070309020205020404" pitchFamily="49" charset="0"/>
-                <a:cs typeface="Courier New" panose="02070309020205020404" pitchFamily="49" charset="0"/>
-              </a:rPr>
-              <a:t>actionPerformed</a:t>
-            </a:r>
-            <a:r>
-              <a:rPr lang="en-US" altLang="en-US" dirty="0"/>
-              <a:t> method of the listener</a:t>
-            </a:r>
+            <a:endParaRPr lang="en-US" altLang="en-US" dirty="0"/>
           </a:p>
         </p:txBody>
       </p:sp>
     </p:spTree>
     <p:extLst>
       <p:ext uri="{BB962C8B-B14F-4D97-AF65-F5344CB8AC3E}">
-        <p14:creationId xmlns:p14="http://schemas.microsoft.com/office/powerpoint/2010/main" val="819291208"/>
+        <p14:creationId xmlns:p14="http://schemas.microsoft.com/office/powerpoint/2010/main" val="1755264352"/>
       </p:ext>
     </p:extLst>
   </p:cSld>
@@ -16507,9 +16557,954 @@
           <a:lstStyle/>
           <a:p>
             <a:r>
-              <a:rPr lang="en-US" altLang="en-US" dirty="0"/>
-              <a:t>Dialog Boxes Demo App</a:t>
+              <a:rPr lang="en-US" altLang="en-US" dirty="0" smtClean="0"/>
+              <a:t>Memento Pattern: solution</a:t>
             </a:r>
+            <a:endParaRPr lang="en-US" altLang="en-US" dirty="0"/>
+          </a:p>
+        </p:txBody>
+      </p:sp>
+      <p:grpSp>
+        <p:nvGrpSpPr>
+          <p:cNvPr id="59" name="Group 58"/>
+          <p:cNvGrpSpPr/>
+          <p:nvPr/>
+        </p:nvGrpSpPr>
+        <p:grpSpPr>
+          <a:xfrm>
+            <a:off x="685800" y="1194291"/>
+            <a:ext cx="6859359" cy="5609812"/>
+            <a:chOff x="685800" y="1194291"/>
+            <a:chExt cx="6859359" cy="5609812"/>
+          </a:xfrm>
+        </p:grpSpPr>
+        <p:sp>
+          <p:nvSpPr>
+            <p:cNvPr id="5" name="Rectangle 4"/>
+            <p:cNvSpPr/>
+            <p:nvPr/>
+          </p:nvSpPr>
+          <p:spPr>
+            <a:xfrm>
+              <a:off x="685800" y="2155903"/>
+              <a:ext cx="1981200" cy="2286000"/>
+            </a:xfrm>
+            <a:prstGeom prst="rect">
+              <a:avLst/>
+            </a:prstGeom>
+            <a:noFill/>
+            <a:ln>
+              <a:solidFill>
+                <a:schemeClr val="tx1"/>
+              </a:solidFill>
+            </a:ln>
+          </p:spPr>
+          <p:style>
+            <a:lnRef idx="2">
+              <a:schemeClr val="accent1">
+                <a:shade val="50000"/>
+              </a:schemeClr>
+            </a:lnRef>
+            <a:fillRef idx="1">
+              <a:schemeClr val="accent1"/>
+            </a:fillRef>
+            <a:effectRef idx="0">
+              <a:schemeClr val="accent1"/>
+            </a:effectRef>
+            <a:fontRef idx="minor">
+              <a:schemeClr val="lt1"/>
+            </a:fontRef>
+          </p:style>
+          <p:txBody>
+            <a:bodyPr rtlCol="0" anchor="ctr"/>
+            <a:lstStyle/>
+            <a:p>
+              <a:pPr algn="ctr"/>
+              <a:endParaRPr lang="en-US"/>
+            </a:p>
+          </p:txBody>
+        </p:sp>
+        <p:cxnSp>
+          <p:nvCxnSpPr>
+            <p:cNvPr id="7" name="Straight Connector 6"/>
+            <p:cNvCxnSpPr/>
+            <p:nvPr/>
+          </p:nvCxnSpPr>
+          <p:spPr>
+            <a:xfrm>
+              <a:off x="685800" y="2689303"/>
+              <a:ext cx="1981200" cy="0"/>
+            </a:xfrm>
+            <a:prstGeom prst="line">
+              <a:avLst/>
+            </a:prstGeom>
+            <a:ln w="25400">
+              <a:solidFill>
+                <a:schemeClr val="tx1"/>
+              </a:solidFill>
+            </a:ln>
+          </p:spPr>
+          <p:style>
+            <a:lnRef idx="1">
+              <a:schemeClr val="accent1"/>
+            </a:lnRef>
+            <a:fillRef idx="0">
+              <a:schemeClr val="accent1"/>
+            </a:fillRef>
+            <a:effectRef idx="0">
+              <a:schemeClr val="accent1"/>
+            </a:effectRef>
+            <a:fontRef idx="minor">
+              <a:schemeClr val="tx1"/>
+            </a:fontRef>
+          </p:style>
+        </p:cxnSp>
+        <p:sp>
+          <p:nvSpPr>
+            <p:cNvPr id="10" name="TextBox 9"/>
+            <p:cNvSpPr txBox="1"/>
+            <p:nvPr/>
+          </p:nvSpPr>
+          <p:spPr>
+            <a:xfrm>
+              <a:off x="1176102" y="2207160"/>
+              <a:ext cx="1000595" cy="430887"/>
+            </a:xfrm>
+            <a:prstGeom prst="rect">
+              <a:avLst/>
+            </a:prstGeom>
+            <a:noFill/>
+          </p:spPr>
+          <p:txBody>
+            <a:bodyPr wrap="none" rtlCol="0">
+              <a:spAutoFit/>
+            </a:bodyPr>
+            <a:lstStyle/>
+            <a:p>
+              <a:r>
+                <a:rPr lang="en-US" sz="2200" b="1" dirty="0" smtClean="0"/>
+                <a:t>Editor</a:t>
+              </a:r>
+              <a:endParaRPr lang="en-US" sz="2200" b="1" dirty="0"/>
+            </a:p>
+          </p:txBody>
+        </p:sp>
+        <p:sp>
+          <p:nvSpPr>
+            <p:cNvPr id="13" name="TextBox 12"/>
+            <p:cNvSpPr txBox="1"/>
+            <p:nvPr/>
+          </p:nvSpPr>
+          <p:spPr>
+            <a:xfrm>
+              <a:off x="762000" y="2765503"/>
+              <a:ext cx="1672253" cy="369332"/>
+            </a:xfrm>
+            <a:prstGeom prst="rect">
+              <a:avLst/>
+            </a:prstGeom>
+            <a:noFill/>
+          </p:spPr>
+          <p:txBody>
+            <a:bodyPr wrap="none" rtlCol="0">
+              <a:spAutoFit/>
+            </a:bodyPr>
+            <a:lstStyle/>
+            <a:p>
+              <a:r>
+                <a:rPr lang="en-US" dirty="0"/>
+                <a:t>c</a:t>
+              </a:r>
+              <a:r>
+                <a:rPr lang="en-US" dirty="0" smtClean="0"/>
+                <a:t>ontent: String</a:t>
+              </a:r>
+            </a:p>
+          </p:txBody>
+        </p:sp>
+        <p:sp>
+          <p:nvSpPr>
+            <p:cNvPr id="15" name="Rectangle 14"/>
+            <p:cNvSpPr/>
+            <p:nvPr/>
+          </p:nvSpPr>
+          <p:spPr>
+            <a:xfrm>
+              <a:off x="5561241" y="1546303"/>
+              <a:ext cx="1981200" cy="2286000"/>
+            </a:xfrm>
+            <a:prstGeom prst="rect">
+              <a:avLst/>
+            </a:prstGeom>
+            <a:noFill/>
+            <a:ln>
+              <a:solidFill>
+                <a:schemeClr val="tx1"/>
+              </a:solidFill>
+            </a:ln>
+          </p:spPr>
+          <p:style>
+            <a:lnRef idx="2">
+              <a:schemeClr val="accent1">
+                <a:shade val="50000"/>
+              </a:schemeClr>
+            </a:lnRef>
+            <a:fillRef idx="1">
+              <a:schemeClr val="accent1"/>
+            </a:fillRef>
+            <a:effectRef idx="0">
+              <a:schemeClr val="accent1"/>
+            </a:effectRef>
+            <a:fontRef idx="minor">
+              <a:schemeClr val="lt1"/>
+            </a:fontRef>
+          </p:style>
+          <p:txBody>
+            <a:bodyPr rtlCol="0" anchor="ctr"/>
+            <a:lstStyle/>
+            <a:p>
+              <a:pPr algn="ctr"/>
+              <a:endParaRPr lang="en-US"/>
+            </a:p>
+          </p:txBody>
+        </p:sp>
+        <p:cxnSp>
+          <p:nvCxnSpPr>
+            <p:cNvPr id="16" name="Straight Connector 15"/>
+            <p:cNvCxnSpPr/>
+            <p:nvPr/>
+          </p:nvCxnSpPr>
+          <p:spPr>
+            <a:xfrm>
+              <a:off x="5561241" y="2079703"/>
+              <a:ext cx="1981200" cy="0"/>
+            </a:xfrm>
+            <a:prstGeom prst="line">
+              <a:avLst/>
+            </a:prstGeom>
+            <a:ln w="25400">
+              <a:solidFill>
+                <a:schemeClr val="tx1"/>
+              </a:solidFill>
+            </a:ln>
+          </p:spPr>
+          <p:style>
+            <a:lnRef idx="1">
+              <a:schemeClr val="accent1"/>
+            </a:lnRef>
+            <a:fillRef idx="0">
+              <a:schemeClr val="accent1"/>
+            </a:fillRef>
+            <a:effectRef idx="0">
+              <a:schemeClr val="accent1"/>
+            </a:effectRef>
+            <a:fontRef idx="minor">
+              <a:schemeClr val="tx1"/>
+            </a:fontRef>
+          </p:style>
+        </p:cxnSp>
+        <p:sp>
+          <p:nvSpPr>
+            <p:cNvPr id="17" name="TextBox 16"/>
+            <p:cNvSpPr txBox="1"/>
+            <p:nvPr/>
+          </p:nvSpPr>
+          <p:spPr>
+            <a:xfrm>
+              <a:off x="5715000" y="1597560"/>
+              <a:ext cx="1691489" cy="430887"/>
+            </a:xfrm>
+            <a:prstGeom prst="rect">
+              <a:avLst/>
+            </a:prstGeom>
+            <a:noFill/>
+          </p:spPr>
+          <p:txBody>
+            <a:bodyPr wrap="none" rtlCol="0">
+              <a:spAutoFit/>
+            </a:bodyPr>
+            <a:lstStyle/>
+            <a:p>
+              <a:r>
+                <a:rPr lang="en-US" sz="2200" b="1" dirty="0" err="1" smtClean="0"/>
+                <a:t>EditorState</a:t>
+              </a:r>
+              <a:endParaRPr lang="en-US" sz="2200" b="1" dirty="0"/>
+            </a:p>
+          </p:txBody>
+        </p:sp>
+        <p:sp>
+          <p:nvSpPr>
+            <p:cNvPr id="18" name="TextBox 17"/>
+            <p:cNvSpPr txBox="1"/>
+            <p:nvPr/>
+          </p:nvSpPr>
+          <p:spPr>
+            <a:xfrm>
+              <a:off x="5715000" y="2155903"/>
+              <a:ext cx="1736373" cy="369332"/>
+            </a:xfrm>
+            <a:prstGeom prst="rect">
+              <a:avLst/>
+            </a:prstGeom>
+            <a:noFill/>
+          </p:spPr>
+          <p:txBody>
+            <a:bodyPr wrap="none" rtlCol="0">
+              <a:spAutoFit/>
+            </a:bodyPr>
+            <a:lstStyle/>
+            <a:p>
+              <a:r>
+                <a:rPr lang="en-US" dirty="0"/>
+                <a:t>c</a:t>
+              </a:r>
+              <a:r>
+                <a:rPr lang="en-US" dirty="0" smtClean="0"/>
+                <a:t>ontent: String </a:t>
+              </a:r>
+              <a:endParaRPr lang="en-US" dirty="0"/>
+            </a:p>
+          </p:txBody>
+        </p:sp>
+        <p:cxnSp>
+          <p:nvCxnSpPr>
+            <p:cNvPr id="19" name="Straight Connector 18"/>
+            <p:cNvCxnSpPr/>
+            <p:nvPr/>
+          </p:nvCxnSpPr>
+          <p:spPr>
+            <a:xfrm>
+              <a:off x="5562600" y="2613103"/>
+              <a:ext cx="1981200" cy="0"/>
+            </a:xfrm>
+            <a:prstGeom prst="line">
+              <a:avLst/>
+            </a:prstGeom>
+            <a:ln w="25400">
+              <a:solidFill>
+                <a:schemeClr val="tx1"/>
+              </a:solidFill>
+            </a:ln>
+          </p:spPr>
+          <p:style>
+            <a:lnRef idx="1">
+              <a:schemeClr val="accent1"/>
+            </a:lnRef>
+            <a:fillRef idx="0">
+              <a:schemeClr val="accent1"/>
+            </a:fillRef>
+            <a:effectRef idx="0">
+              <a:schemeClr val="accent1"/>
+            </a:effectRef>
+            <a:fontRef idx="minor">
+              <a:schemeClr val="tx1"/>
+            </a:fontRef>
+          </p:style>
+        </p:cxnSp>
+        <p:sp>
+          <p:nvSpPr>
+            <p:cNvPr id="20" name="Diamond 19"/>
+            <p:cNvSpPr/>
+            <p:nvPr/>
+          </p:nvSpPr>
+          <p:spPr>
+            <a:xfrm>
+              <a:off x="6466173" y="4290845"/>
+              <a:ext cx="189141" cy="212390"/>
+            </a:xfrm>
+            <a:prstGeom prst="diamond">
+              <a:avLst/>
+            </a:prstGeom>
+            <a:noFill/>
+            <a:ln w="19050">
+              <a:solidFill>
+                <a:schemeClr val="tx1"/>
+              </a:solidFill>
+            </a:ln>
+          </p:spPr>
+          <p:style>
+            <a:lnRef idx="2">
+              <a:schemeClr val="accent1">
+                <a:shade val="50000"/>
+              </a:schemeClr>
+            </a:lnRef>
+            <a:fillRef idx="1">
+              <a:schemeClr val="accent1"/>
+            </a:fillRef>
+            <a:effectRef idx="0">
+              <a:schemeClr val="accent1"/>
+            </a:effectRef>
+            <a:fontRef idx="minor">
+              <a:schemeClr val="lt1"/>
+            </a:fontRef>
+          </p:style>
+          <p:txBody>
+            <a:bodyPr rtlCol="0" anchor="ctr"/>
+            <a:lstStyle/>
+            <a:p>
+              <a:pPr algn="ctr"/>
+              <a:endParaRPr lang="en-US"/>
+            </a:p>
+          </p:txBody>
+        </p:sp>
+        <p:sp>
+          <p:nvSpPr>
+            <p:cNvPr id="23" name="Rectangle 22"/>
+            <p:cNvSpPr/>
+            <p:nvPr/>
+          </p:nvSpPr>
+          <p:spPr>
+            <a:xfrm>
+              <a:off x="5562600" y="4518103"/>
+              <a:ext cx="1981200" cy="2286000"/>
+            </a:xfrm>
+            <a:prstGeom prst="rect">
+              <a:avLst/>
+            </a:prstGeom>
+            <a:noFill/>
+            <a:ln>
+              <a:solidFill>
+                <a:schemeClr val="tx1"/>
+              </a:solidFill>
+            </a:ln>
+          </p:spPr>
+          <p:style>
+            <a:lnRef idx="2">
+              <a:schemeClr val="accent1">
+                <a:shade val="50000"/>
+              </a:schemeClr>
+            </a:lnRef>
+            <a:fillRef idx="1">
+              <a:schemeClr val="accent1"/>
+            </a:fillRef>
+            <a:effectRef idx="0">
+              <a:schemeClr val="accent1"/>
+            </a:effectRef>
+            <a:fontRef idx="minor">
+              <a:schemeClr val="lt1"/>
+            </a:fontRef>
+          </p:style>
+          <p:txBody>
+            <a:bodyPr rtlCol="0" anchor="ctr"/>
+            <a:lstStyle/>
+            <a:p>
+              <a:pPr algn="ctr"/>
+              <a:endParaRPr lang="en-US"/>
+            </a:p>
+          </p:txBody>
+        </p:sp>
+        <p:cxnSp>
+          <p:nvCxnSpPr>
+            <p:cNvPr id="24" name="Straight Connector 23"/>
+            <p:cNvCxnSpPr/>
+            <p:nvPr/>
+          </p:nvCxnSpPr>
+          <p:spPr>
+            <a:xfrm>
+              <a:off x="5562600" y="5051503"/>
+              <a:ext cx="1981200" cy="0"/>
+            </a:xfrm>
+            <a:prstGeom prst="line">
+              <a:avLst/>
+            </a:prstGeom>
+            <a:ln w="25400">
+              <a:solidFill>
+                <a:schemeClr val="tx1"/>
+              </a:solidFill>
+            </a:ln>
+          </p:spPr>
+          <p:style>
+            <a:lnRef idx="1">
+              <a:schemeClr val="accent1"/>
+            </a:lnRef>
+            <a:fillRef idx="0">
+              <a:schemeClr val="accent1"/>
+            </a:fillRef>
+            <a:effectRef idx="0">
+              <a:schemeClr val="accent1"/>
+            </a:effectRef>
+            <a:fontRef idx="minor">
+              <a:schemeClr val="tx1"/>
+            </a:fontRef>
+          </p:style>
+        </p:cxnSp>
+        <p:sp>
+          <p:nvSpPr>
+            <p:cNvPr id="25" name="TextBox 24"/>
+            <p:cNvSpPr txBox="1"/>
+            <p:nvPr/>
+          </p:nvSpPr>
+          <p:spPr>
+            <a:xfrm>
+              <a:off x="6019800" y="4569360"/>
+              <a:ext cx="1157689" cy="430887"/>
+            </a:xfrm>
+            <a:prstGeom prst="rect">
+              <a:avLst/>
+            </a:prstGeom>
+            <a:noFill/>
+          </p:spPr>
+          <p:txBody>
+            <a:bodyPr wrap="none" rtlCol="0">
+              <a:spAutoFit/>
+            </a:bodyPr>
+            <a:lstStyle/>
+            <a:p>
+              <a:r>
+                <a:rPr lang="en-US" sz="2200" b="1" dirty="0" smtClean="0"/>
+                <a:t>History</a:t>
+              </a:r>
+              <a:endParaRPr lang="en-US" sz="2200" b="1" dirty="0"/>
+            </a:p>
+          </p:txBody>
+        </p:sp>
+        <p:sp>
+          <p:nvSpPr>
+            <p:cNvPr id="26" name="TextBox 25"/>
+            <p:cNvSpPr txBox="1"/>
+            <p:nvPr/>
+          </p:nvSpPr>
+          <p:spPr>
+            <a:xfrm>
+              <a:off x="5716359" y="5127703"/>
+              <a:ext cx="1351652" cy="369332"/>
+            </a:xfrm>
+            <a:prstGeom prst="rect">
+              <a:avLst/>
+            </a:prstGeom>
+            <a:noFill/>
+          </p:spPr>
+          <p:txBody>
+            <a:bodyPr wrap="none" rtlCol="0">
+              <a:spAutoFit/>
+            </a:bodyPr>
+            <a:lstStyle/>
+            <a:p>
+              <a:r>
+                <a:rPr lang="en-US" dirty="0" smtClean="0"/>
+                <a:t>states: List </a:t>
+              </a:r>
+              <a:endParaRPr lang="en-US" dirty="0"/>
+            </a:p>
+          </p:txBody>
+        </p:sp>
+        <p:cxnSp>
+          <p:nvCxnSpPr>
+            <p:cNvPr id="27" name="Straight Connector 26"/>
+            <p:cNvCxnSpPr/>
+            <p:nvPr/>
+          </p:nvCxnSpPr>
+          <p:spPr>
+            <a:xfrm>
+              <a:off x="5563959" y="5584903"/>
+              <a:ext cx="1981200" cy="0"/>
+            </a:xfrm>
+            <a:prstGeom prst="line">
+              <a:avLst/>
+            </a:prstGeom>
+            <a:ln w="25400">
+              <a:solidFill>
+                <a:schemeClr val="tx1"/>
+              </a:solidFill>
+            </a:ln>
+          </p:spPr>
+          <p:style>
+            <a:lnRef idx="1">
+              <a:schemeClr val="accent1"/>
+            </a:lnRef>
+            <a:fillRef idx="0">
+              <a:schemeClr val="accent1"/>
+            </a:fillRef>
+            <a:effectRef idx="0">
+              <a:schemeClr val="accent1"/>
+            </a:effectRef>
+            <a:fontRef idx="minor">
+              <a:schemeClr val="tx1"/>
+            </a:fontRef>
+          </p:style>
+        </p:cxnSp>
+        <p:cxnSp>
+          <p:nvCxnSpPr>
+            <p:cNvPr id="47" name="Straight Arrow Connector 46"/>
+            <p:cNvCxnSpPr>
+              <a:stCxn id="20" idx="0"/>
+              <a:endCxn id="15" idx="2"/>
+            </p:cNvCxnSpPr>
+            <p:nvPr/>
+          </p:nvCxnSpPr>
+          <p:spPr>
+            <a:xfrm flipH="1" flipV="1">
+              <a:off x="6551841" y="3832303"/>
+              <a:ext cx="8903" cy="458542"/>
+            </a:xfrm>
+            <a:prstGeom prst="straightConnector1">
+              <a:avLst/>
+            </a:prstGeom>
+            <a:ln w="28575">
+              <a:solidFill>
+                <a:schemeClr val="tx1"/>
+              </a:solidFill>
+              <a:tailEnd type="triangle"/>
+            </a:ln>
+          </p:spPr>
+          <p:style>
+            <a:lnRef idx="1">
+              <a:schemeClr val="accent1"/>
+            </a:lnRef>
+            <a:fillRef idx="0">
+              <a:schemeClr val="accent1"/>
+            </a:fillRef>
+            <a:effectRef idx="0">
+              <a:schemeClr val="accent1"/>
+            </a:effectRef>
+            <a:fontRef idx="minor">
+              <a:schemeClr val="tx1"/>
+            </a:fontRef>
+          </p:style>
+        </p:cxnSp>
+        <p:sp>
+          <p:nvSpPr>
+            <p:cNvPr id="55" name="TextBox 54"/>
+            <p:cNvSpPr txBox="1"/>
+            <p:nvPr/>
+          </p:nvSpPr>
+          <p:spPr>
+            <a:xfrm>
+              <a:off x="5715000" y="5584903"/>
+              <a:ext cx="1338828" cy="646331"/>
+            </a:xfrm>
+            <a:prstGeom prst="rect">
+              <a:avLst/>
+            </a:prstGeom>
+            <a:noFill/>
+          </p:spPr>
+          <p:txBody>
+            <a:bodyPr wrap="none" rtlCol="0">
+              <a:spAutoFit/>
+            </a:bodyPr>
+            <a:lstStyle/>
+            <a:p>
+              <a:r>
+                <a:rPr lang="en-US" dirty="0" smtClean="0"/>
+                <a:t>push(state)</a:t>
+              </a:r>
+            </a:p>
+            <a:p>
+              <a:r>
+                <a:rPr lang="en-US" dirty="0" smtClean="0"/>
+                <a:t>pop() </a:t>
+              </a:r>
+              <a:endParaRPr lang="en-US" dirty="0"/>
+            </a:p>
+          </p:txBody>
+        </p:sp>
+        <p:cxnSp>
+          <p:nvCxnSpPr>
+            <p:cNvPr id="56" name="Straight Connector 55"/>
+            <p:cNvCxnSpPr/>
+            <p:nvPr/>
+          </p:nvCxnSpPr>
+          <p:spPr>
+            <a:xfrm>
+              <a:off x="685800" y="3146503"/>
+              <a:ext cx="1981200" cy="0"/>
+            </a:xfrm>
+            <a:prstGeom prst="line">
+              <a:avLst/>
+            </a:prstGeom>
+            <a:ln w="25400">
+              <a:solidFill>
+                <a:schemeClr val="tx1"/>
+              </a:solidFill>
+            </a:ln>
+          </p:spPr>
+          <p:style>
+            <a:lnRef idx="1">
+              <a:schemeClr val="accent1"/>
+            </a:lnRef>
+            <a:fillRef idx="0">
+              <a:schemeClr val="accent1"/>
+            </a:fillRef>
+            <a:effectRef idx="0">
+              <a:schemeClr val="accent1"/>
+            </a:effectRef>
+            <a:fontRef idx="minor">
+              <a:schemeClr val="tx1"/>
+            </a:fontRef>
+          </p:style>
+        </p:cxnSp>
+        <p:sp>
+          <p:nvSpPr>
+            <p:cNvPr id="57" name="TextBox 56"/>
+            <p:cNvSpPr txBox="1"/>
+            <p:nvPr/>
+          </p:nvSpPr>
+          <p:spPr>
+            <a:xfrm>
+              <a:off x="762000" y="3146503"/>
+              <a:ext cx="1556836" cy="646331"/>
+            </a:xfrm>
+            <a:prstGeom prst="rect">
+              <a:avLst/>
+            </a:prstGeom>
+            <a:noFill/>
+          </p:spPr>
+          <p:txBody>
+            <a:bodyPr wrap="none" rtlCol="0">
+              <a:spAutoFit/>
+            </a:bodyPr>
+            <a:lstStyle/>
+            <a:p>
+              <a:r>
+                <a:rPr lang="en-US" dirty="0" err="1" smtClean="0"/>
+                <a:t>createState</a:t>
+              </a:r>
+              <a:r>
+                <a:rPr lang="en-US" dirty="0" smtClean="0"/>
+                <a:t>()</a:t>
+              </a:r>
+            </a:p>
+            <a:p>
+              <a:r>
+                <a:rPr lang="en-US" dirty="0"/>
+                <a:t>r</a:t>
+              </a:r>
+              <a:r>
+                <a:rPr lang="en-US" dirty="0" smtClean="0"/>
+                <a:t>estore(state)</a:t>
+              </a:r>
+              <a:endParaRPr lang="en-US" dirty="0"/>
+            </a:p>
+          </p:txBody>
+        </p:sp>
+        <p:cxnSp>
+          <p:nvCxnSpPr>
+            <p:cNvPr id="49" name="Straight Arrow Connector 48"/>
+            <p:cNvCxnSpPr/>
+            <p:nvPr/>
+          </p:nvCxnSpPr>
+          <p:spPr>
+            <a:xfrm>
+              <a:off x="2667000" y="2950169"/>
+              <a:ext cx="2894241" cy="0"/>
+            </a:xfrm>
+            <a:prstGeom prst="straightConnector1">
+              <a:avLst/>
+            </a:prstGeom>
+            <a:ln w="28575">
+              <a:solidFill>
+                <a:schemeClr val="tx1"/>
+              </a:solidFill>
+              <a:prstDash val="dashDot"/>
+              <a:tailEnd type="triangle"/>
+            </a:ln>
+          </p:spPr>
+          <p:style>
+            <a:lnRef idx="1">
+              <a:schemeClr val="accent1"/>
+            </a:lnRef>
+            <a:fillRef idx="0">
+              <a:schemeClr val="accent1"/>
+            </a:fillRef>
+            <a:effectRef idx="0">
+              <a:schemeClr val="accent1"/>
+            </a:effectRef>
+            <a:fontRef idx="minor">
+              <a:schemeClr val="tx1"/>
+            </a:fontRef>
+          </p:style>
+        </p:cxnSp>
+        <p:sp>
+          <p:nvSpPr>
+            <p:cNvPr id="58" name="TextBox 57"/>
+            <p:cNvSpPr txBox="1"/>
+            <p:nvPr/>
+          </p:nvSpPr>
+          <p:spPr>
+            <a:xfrm>
+              <a:off x="1077517" y="1688405"/>
+              <a:ext cx="1300356" cy="369332"/>
+            </a:xfrm>
+            <a:prstGeom prst="rect">
+              <a:avLst/>
+            </a:prstGeom>
+            <a:noFill/>
+          </p:spPr>
+          <p:txBody>
+            <a:bodyPr wrap="none" rtlCol="0">
+              <a:spAutoFit/>
+            </a:bodyPr>
+            <a:lstStyle/>
+            <a:p>
+              <a:r>
+                <a:rPr lang="en-US" b="1" dirty="0" smtClean="0">
+                  <a:solidFill>
+                    <a:srgbClr val="FF0000"/>
+                  </a:solidFill>
+                </a:rPr>
+                <a:t>Originator</a:t>
+              </a:r>
+              <a:endParaRPr lang="en-US" b="1" dirty="0">
+                <a:solidFill>
+                  <a:srgbClr val="FF0000"/>
+                </a:solidFill>
+              </a:endParaRPr>
+            </a:p>
+          </p:txBody>
+        </p:sp>
+        <p:sp>
+          <p:nvSpPr>
+            <p:cNvPr id="61" name="TextBox 60"/>
+            <p:cNvSpPr txBox="1"/>
+            <p:nvPr/>
+          </p:nvSpPr>
+          <p:spPr>
+            <a:xfrm>
+              <a:off x="5948466" y="1194291"/>
+              <a:ext cx="1197764" cy="369332"/>
+            </a:xfrm>
+            <a:prstGeom prst="rect">
+              <a:avLst/>
+            </a:prstGeom>
+            <a:noFill/>
+          </p:spPr>
+          <p:txBody>
+            <a:bodyPr wrap="none" rtlCol="0">
+              <a:spAutoFit/>
+            </a:bodyPr>
+            <a:lstStyle/>
+            <a:p>
+              <a:r>
+                <a:rPr lang="en-US" b="1" dirty="0" smtClean="0">
+                  <a:solidFill>
+                    <a:srgbClr val="FF0000"/>
+                  </a:solidFill>
+                </a:rPr>
+                <a:t>Memento</a:t>
+              </a:r>
+              <a:endParaRPr lang="en-US" b="1" dirty="0">
+                <a:solidFill>
+                  <a:srgbClr val="FF0000"/>
+                </a:solidFill>
+              </a:endParaRPr>
+            </a:p>
+          </p:txBody>
+        </p:sp>
+        <p:sp>
+          <p:nvSpPr>
+            <p:cNvPr id="62" name="TextBox 61"/>
+            <p:cNvSpPr txBox="1"/>
+            <p:nvPr/>
+          </p:nvSpPr>
+          <p:spPr>
+            <a:xfrm>
+              <a:off x="4021746" y="5400237"/>
+              <a:ext cx="1249060" cy="369332"/>
+            </a:xfrm>
+            <a:prstGeom prst="rect">
+              <a:avLst/>
+            </a:prstGeom>
+            <a:noFill/>
+          </p:spPr>
+          <p:txBody>
+            <a:bodyPr wrap="none" rtlCol="0">
+              <a:spAutoFit/>
+            </a:bodyPr>
+            <a:lstStyle/>
+            <a:p>
+              <a:r>
+                <a:rPr lang="en-US" b="1" dirty="0">
+                  <a:solidFill>
+                    <a:srgbClr val="FF0000"/>
+                  </a:solidFill>
+                </a:rPr>
+                <a:t>C</a:t>
+              </a:r>
+              <a:r>
+                <a:rPr lang="en-US" b="1" dirty="0" smtClean="0">
+                  <a:solidFill>
+                    <a:srgbClr val="FF0000"/>
+                  </a:solidFill>
+                </a:rPr>
+                <a:t>aretaker</a:t>
+              </a:r>
+              <a:endParaRPr lang="en-US" b="1" dirty="0">
+                <a:solidFill>
+                  <a:srgbClr val="FF0000"/>
+                </a:solidFill>
+              </a:endParaRPr>
+            </a:p>
+          </p:txBody>
+        </p:sp>
+      </p:grpSp>
+    </p:spTree>
+    <p:extLst>
+      <p:ext uri="{BB962C8B-B14F-4D97-AF65-F5344CB8AC3E}">
+        <p14:creationId xmlns:p14="http://schemas.microsoft.com/office/powerpoint/2010/main" val="2275668930"/>
+      </p:ext>
+    </p:extLst>
+  </p:cSld>
+  <p:clrMapOvr>
+    <a:masterClrMapping/>
+  </p:clrMapOvr>
+  <p:transition spd="slow"/>
+</p:sld>
+</file>
+
+<file path=ppt/slides/slide7.xml><?xml version="1.0" encoding="utf-8"?>
+<p:sld xmlns:a="http://schemas.openxmlformats.org/drawingml/2006/main" xmlns:r="http://schemas.openxmlformats.org/officeDocument/2006/relationships" xmlns:p="http://schemas.openxmlformats.org/presentationml/2006/main">
+  <p:cSld>
+    <p:spTree>
+      <p:nvGrpSpPr>
+        <p:cNvPr id="1" name=""/>
+        <p:cNvGrpSpPr/>
+        <p:nvPr/>
+      </p:nvGrpSpPr>
+      <p:grpSpPr>
+        <a:xfrm>
+          <a:off x="0" y="0"/>
+          <a:ext cx="0" cy="0"/>
+          <a:chOff x="0" y="0"/>
+          <a:chExt cx="0" cy="0"/>
+        </a:xfrm>
+      </p:grpSpPr>
+      <p:sp>
+        <p:nvSpPr>
+          <p:cNvPr id="4098" name="Rectangle 2">
+            <a:extLst>
+              <a:ext uri="{FF2B5EF4-FFF2-40B4-BE49-F238E27FC236}">
+                <a16:creationId xmlns:a16="http://schemas.microsoft.com/office/drawing/2014/main" id="{E0B02B1D-F208-44FE-82D9-8B54674385E7}"/>
+              </a:ext>
+            </a:extLst>
+          </p:cNvPr>
+          <p:cNvSpPr>
+            <a:spLocks noGrp="1" noChangeArrowheads="1"/>
+          </p:cNvSpPr>
+          <p:nvPr>
+            <p:ph type="title"/>
+          </p:nvPr>
+        </p:nvSpPr>
+        <p:spPr>
+          <a:xfrm>
+            <a:off x="0" y="0"/>
+            <a:ext cx="7543800" cy="1295400"/>
+          </a:xfrm>
+          <a:noFill/>
+        </p:spPr>
+        <p:txBody>
+          <a:bodyPr lIns="92075" tIns="46038" rIns="92075" bIns="46038"/>
+          <a:lstStyle/>
+          <a:p>
+            <a:r>
+              <a:rPr lang="en-US" altLang="en-US" dirty="0" smtClean="0"/>
+              <a:t>State</a:t>
+            </a:r>
+            <a:r>
+              <a:rPr lang="en-US" altLang="en-US" dirty="0" smtClean="0"/>
+              <a:t> Pattern: introduction</a:t>
+            </a:r>
+            <a:endParaRPr lang="en-US" altLang="en-US" dirty="0"/>
           </a:p>
         </p:txBody>
       </p:sp>
@@ -16531,8 +17526,8 @@
         </p:nvSpPr>
         <p:spPr>
           <a:xfrm>
-            <a:off x="0" y="1371600"/>
-            <a:ext cx="9144000" cy="5486400"/>
+            <a:off x="0" y="1600200"/>
+            <a:ext cx="9144000" cy="5257799"/>
           </a:xfrm>
           <a:noFill/>
         </p:spPr>
@@ -16546,8 +17541,8 @@
               </a:spcBef>
             </a:pPr>
             <a:r>
-              <a:rPr lang="en-US" altLang="en-US" dirty="0"/>
-              <a:t>A dialog box is a window</a:t>
+              <a:rPr lang="en-US" altLang="en-US" dirty="0" smtClean="0"/>
+              <a:t>It:</a:t>
             </a:r>
           </a:p>
           <a:p>
@@ -16558,8 +17553,51 @@
             </a:pPr>
             <a:r>
               <a:rPr lang="en-US" altLang="en-US" dirty="0"/>
-              <a:t>That appears on top of any current active window</a:t>
+              <a:t>i</a:t>
             </a:r>
+            <a:r>
+              <a:rPr lang="en-US" altLang="en-US" dirty="0" smtClean="0"/>
+              <a:t>s an example of a behavioral design pattern</a:t>
+            </a:r>
+          </a:p>
+          <a:p>
+            <a:pPr lvl="1">
+              <a:spcBef>
+                <a:spcPct val="70000"/>
+              </a:spcBef>
+            </a:pPr>
+            <a:endParaRPr lang="en-US" altLang="en-US" dirty="0"/>
+          </a:p>
+          <a:p>
+            <a:pPr lvl="1">
+              <a:spcBef>
+                <a:spcPct val="70000"/>
+              </a:spcBef>
+            </a:pPr>
+            <a:r>
+              <a:rPr lang="en-US" altLang="en-US" dirty="0" smtClean="0"/>
+              <a:t>allows an object to alter its behavior </a:t>
+            </a:r>
+          </a:p>
+          <a:p>
+            <a:pPr lvl="2">
+              <a:spcBef>
+                <a:spcPct val="70000"/>
+              </a:spcBef>
+            </a:pPr>
+            <a:r>
+              <a:rPr lang="en-US" altLang="en-US" dirty="0" smtClean="0"/>
+              <a:t>depending on its current state</a:t>
+            </a:r>
+            <a:endParaRPr lang="en-US" altLang="en-US" dirty="0"/>
+          </a:p>
+          <a:p>
+            <a:pPr lvl="2">
+              <a:spcBef>
+                <a:spcPct val="70000"/>
+              </a:spcBef>
+            </a:pPr>
+            <a:endParaRPr lang="en-US" altLang="en-US" dirty="0"/>
           </a:p>
           <a:p>
             <a:pPr>
@@ -16568,19 +17606,8 @@
               </a:spcBef>
             </a:pPr>
             <a:r>
-              <a:rPr lang="en-US" altLang="en-US" dirty="0"/>
-              <a:t>The </a:t>
-            </a:r>
-            <a:r>
-              <a:rPr lang="en-US" altLang="en-US" dirty="0" err="1">
-                <a:latin typeface="Courier New" panose="02070309020205020404" pitchFamily="49" charset="0"/>
-                <a:cs typeface="Courier New" panose="02070309020205020404" pitchFamily="49" charset="0"/>
-              </a:rPr>
-              <a:t>JOptionPane</a:t>
-            </a:r>
-            <a:r>
-              <a:rPr lang="en-US" altLang="en-US" dirty="0"/>
-              <a:t> class </a:t>
+              <a:rPr lang="en-US" altLang="en-US" dirty="0" smtClean="0"/>
+              <a:t>Case study:</a:t>
             </a:r>
           </a:p>
           <a:p>
@@ -16590,103 +17617,1327 @@
               </a:spcBef>
             </a:pPr>
             <a:r>
-              <a:rPr lang="en-US" altLang="en-US" dirty="0"/>
-              <a:t>provides methods for creation of dialog boxes through</a:t>
+              <a:rPr lang="en-US" altLang="en-US" dirty="0" smtClean="0"/>
+              <a:t>Enable a Canvas to support multiple tools</a:t>
             </a:r>
-          </a:p>
-          <a:p>
-            <a:pPr lvl="2">
-              <a:spcBef>
-                <a:spcPct val="70000"/>
-              </a:spcBef>
-            </a:pPr>
-            <a:r>
-              <a:rPr lang="en-US" altLang="en-US" dirty="0" err="1">
-                <a:latin typeface="Courier New" panose="02070309020205020404" pitchFamily="49" charset="0"/>
-                <a:cs typeface="Courier New" panose="02070309020205020404" pitchFamily="49" charset="0"/>
-              </a:rPr>
-              <a:t>showInputDialog</a:t>
-            </a:r>
-            <a:endParaRPr lang="en-US" altLang="en-US" dirty="0">
-              <a:latin typeface="Courier New" panose="02070309020205020404" pitchFamily="49" charset="0"/>
-              <a:cs typeface="Courier New" panose="02070309020205020404" pitchFamily="49" charset="0"/>
-            </a:endParaRPr>
-          </a:p>
-          <a:p>
-            <a:pPr lvl="3">
-              <a:spcBef>
-                <a:spcPct val="70000"/>
-              </a:spcBef>
-            </a:pPr>
-            <a:r>
-              <a:rPr lang="en-US" altLang="en-US" dirty="0"/>
-              <a:t>Creates a dialog box for collecting data from the user</a:t>
-            </a:r>
-          </a:p>
-          <a:p>
-            <a:pPr lvl="2">
-              <a:spcBef>
-                <a:spcPct val="70000"/>
-              </a:spcBef>
-            </a:pPr>
-            <a:r>
-              <a:rPr lang="en-US" altLang="en-US" dirty="0" err="1">
-                <a:latin typeface="Courier New" panose="02070309020205020404" pitchFamily="49" charset="0"/>
-                <a:cs typeface="Courier New" panose="02070309020205020404" pitchFamily="49" charset="0"/>
-              </a:rPr>
-              <a:t>showMessageDialog</a:t>
-            </a:r>
-            <a:endParaRPr lang="en-US" altLang="en-US" dirty="0">
-              <a:latin typeface="Courier New" panose="02070309020205020404" pitchFamily="49" charset="0"/>
-              <a:cs typeface="Courier New" panose="02070309020205020404" pitchFamily="49" charset="0"/>
-            </a:endParaRPr>
-          </a:p>
-          <a:p>
-            <a:pPr lvl="3">
-              <a:spcBef>
-                <a:spcPct val="70000"/>
-              </a:spcBef>
-            </a:pPr>
-            <a:r>
-              <a:rPr lang="en-US" altLang="en-US" dirty="0"/>
-              <a:t>Creates a dialog for displaying a message to the user</a:t>
-            </a:r>
-          </a:p>
-          <a:p>
-            <a:pPr lvl="2">
-              <a:spcBef>
-                <a:spcPct val="70000"/>
-              </a:spcBef>
-            </a:pPr>
-            <a:r>
-              <a:rPr lang="en-US" altLang="en-US" dirty="0" err="1">
-                <a:latin typeface="Courier New" panose="02070309020205020404" pitchFamily="49" charset="0"/>
-                <a:cs typeface="Courier New" panose="02070309020205020404" pitchFamily="49" charset="0"/>
-              </a:rPr>
-              <a:t>showConfirmDialog</a:t>
-            </a:r>
-            <a:endParaRPr lang="en-US" altLang="en-US" dirty="0">
-              <a:latin typeface="Courier New" panose="02070309020205020404" pitchFamily="49" charset="0"/>
-              <a:cs typeface="Courier New" panose="02070309020205020404" pitchFamily="49" charset="0"/>
-            </a:endParaRPr>
-          </a:p>
-          <a:p>
-            <a:pPr lvl="3">
-              <a:spcBef>
-                <a:spcPct val="70000"/>
-              </a:spcBef>
-            </a:pPr>
-            <a:r>
-              <a:rPr lang="en-US" altLang="en-US" dirty="0"/>
-              <a:t>Creates a dialog presenting user with yes-or-no question</a:t>
-            </a:r>
+            <a:endParaRPr lang="en-US" altLang="en-US" dirty="0"/>
           </a:p>
         </p:txBody>
       </p:sp>
     </p:spTree>
     <p:extLst>
       <p:ext uri="{BB962C8B-B14F-4D97-AF65-F5344CB8AC3E}">
-        <p14:creationId xmlns:p14="http://schemas.microsoft.com/office/powerpoint/2010/main" val="611687900"/>
+        <p14:creationId xmlns:p14="http://schemas.microsoft.com/office/powerpoint/2010/main" val="231063724"/>
+      </p:ext>
+    </p:extLst>
+  </p:cSld>
+  <p:clrMapOvr>
+    <a:masterClrMapping/>
+  </p:clrMapOvr>
+  <p:transition spd="slow"/>
+</p:sld>
+</file>
+
+<file path=ppt/slides/slide8.xml><?xml version="1.0" encoding="utf-8"?>
+<p:sld xmlns:a="http://schemas.openxmlformats.org/drawingml/2006/main" xmlns:r="http://schemas.openxmlformats.org/officeDocument/2006/relationships" xmlns:p="http://schemas.openxmlformats.org/presentationml/2006/main">
+  <p:cSld>
+    <p:spTree>
+      <p:nvGrpSpPr>
+        <p:cNvPr id="1" name=""/>
+        <p:cNvGrpSpPr/>
+        <p:nvPr/>
+      </p:nvGrpSpPr>
+      <p:grpSpPr>
+        <a:xfrm>
+          <a:off x="0" y="0"/>
+          <a:ext cx="0" cy="0"/>
+          <a:chOff x="0" y="0"/>
+          <a:chExt cx="0" cy="0"/>
+        </a:xfrm>
+      </p:grpSpPr>
+      <p:sp>
+        <p:nvSpPr>
+          <p:cNvPr id="4098" name="Rectangle 2">
+            <a:extLst>
+              <a:ext uri="{FF2B5EF4-FFF2-40B4-BE49-F238E27FC236}">
+                <a16:creationId xmlns:a16="http://schemas.microsoft.com/office/drawing/2014/main" id="{E0B02B1D-F208-44FE-82D9-8B54674385E7}"/>
+              </a:ext>
+            </a:extLst>
+          </p:cNvPr>
+          <p:cNvSpPr>
+            <a:spLocks noGrp="1" noChangeArrowheads="1"/>
+          </p:cNvSpPr>
+          <p:nvPr>
+            <p:ph type="title"/>
+          </p:nvPr>
+        </p:nvSpPr>
+        <p:spPr>
+          <a:xfrm>
+            <a:off x="0" y="0"/>
+            <a:ext cx="7543800" cy="1295400"/>
+          </a:xfrm>
+          <a:noFill/>
+        </p:spPr>
+        <p:txBody>
+          <a:bodyPr lIns="92075" tIns="46038" rIns="92075" bIns="46038"/>
+          <a:lstStyle/>
+          <a:p>
+            <a:r>
+              <a:rPr lang="en-US" altLang="en-US" smtClean="0"/>
+              <a:t>State </a:t>
+            </a:r>
+            <a:r>
+              <a:rPr lang="en-US" altLang="en-US" dirty="0" smtClean="0"/>
+              <a:t>Pattern: solution</a:t>
+            </a:r>
+            <a:endParaRPr lang="en-US" altLang="en-US" dirty="0"/>
+          </a:p>
+        </p:txBody>
+      </p:sp>
+      <p:grpSp>
+        <p:nvGrpSpPr>
+          <p:cNvPr id="43" name="Group 42"/>
+          <p:cNvGrpSpPr/>
+          <p:nvPr/>
+        </p:nvGrpSpPr>
+        <p:grpSpPr>
+          <a:xfrm>
+            <a:off x="457200" y="1171988"/>
+            <a:ext cx="8305800" cy="5609812"/>
+            <a:chOff x="685800" y="1171988"/>
+            <a:chExt cx="8305800" cy="5609812"/>
+          </a:xfrm>
+        </p:grpSpPr>
+        <p:sp>
+          <p:nvSpPr>
+            <p:cNvPr id="5" name="Rectangle 4"/>
+            <p:cNvSpPr/>
+            <p:nvPr/>
+          </p:nvSpPr>
+          <p:spPr>
+            <a:xfrm>
+              <a:off x="685800" y="2133600"/>
+              <a:ext cx="1981200" cy="2286000"/>
+            </a:xfrm>
+            <a:prstGeom prst="rect">
+              <a:avLst/>
+            </a:prstGeom>
+            <a:noFill/>
+            <a:ln>
+              <a:solidFill>
+                <a:schemeClr val="tx1"/>
+              </a:solidFill>
+            </a:ln>
+          </p:spPr>
+          <p:style>
+            <a:lnRef idx="2">
+              <a:schemeClr val="accent1">
+                <a:shade val="50000"/>
+              </a:schemeClr>
+            </a:lnRef>
+            <a:fillRef idx="1">
+              <a:schemeClr val="accent1"/>
+            </a:fillRef>
+            <a:effectRef idx="0">
+              <a:schemeClr val="accent1"/>
+            </a:effectRef>
+            <a:fontRef idx="minor">
+              <a:schemeClr val="lt1"/>
+            </a:fontRef>
+          </p:style>
+          <p:txBody>
+            <a:bodyPr rtlCol="0" anchor="ctr"/>
+            <a:lstStyle/>
+            <a:p>
+              <a:pPr algn="ctr"/>
+              <a:endParaRPr lang="en-US"/>
+            </a:p>
+          </p:txBody>
+        </p:sp>
+        <p:cxnSp>
+          <p:nvCxnSpPr>
+            <p:cNvPr id="7" name="Straight Connector 6"/>
+            <p:cNvCxnSpPr/>
+            <p:nvPr/>
+          </p:nvCxnSpPr>
+          <p:spPr>
+            <a:xfrm>
+              <a:off x="685800" y="2667000"/>
+              <a:ext cx="1981200" cy="0"/>
+            </a:xfrm>
+            <a:prstGeom prst="line">
+              <a:avLst/>
+            </a:prstGeom>
+            <a:ln w="25400">
+              <a:solidFill>
+                <a:schemeClr val="tx1"/>
+              </a:solidFill>
+            </a:ln>
+          </p:spPr>
+          <p:style>
+            <a:lnRef idx="1">
+              <a:schemeClr val="accent1"/>
+            </a:lnRef>
+            <a:fillRef idx="0">
+              <a:schemeClr val="accent1"/>
+            </a:fillRef>
+            <a:effectRef idx="0">
+              <a:schemeClr val="accent1"/>
+            </a:effectRef>
+            <a:fontRef idx="minor">
+              <a:schemeClr val="tx1"/>
+            </a:fontRef>
+          </p:style>
+        </p:cxnSp>
+        <p:sp>
+          <p:nvSpPr>
+            <p:cNvPr id="10" name="TextBox 9"/>
+            <p:cNvSpPr txBox="1"/>
+            <p:nvPr/>
+          </p:nvSpPr>
+          <p:spPr>
+            <a:xfrm>
+              <a:off x="1096251" y="2184857"/>
+              <a:ext cx="1189749" cy="430887"/>
+            </a:xfrm>
+            <a:prstGeom prst="rect">
+              <a:avLst/>
+            </a:prstGeom>
+            <a:noFill/>
+          </p:spPr>
+          <p:txBody>
+            <a:bodyPr wrap="none" rtlCol="0">
+              <a:spAutoFit/>
+            </a:bodyPr>
+            <a:lstStyle/>
+            <a:p>
+              <a:r>
+                <a:rPr lang="en-US" sz="2200" b="1" dirty="0" smtClean="0"/>
+                <a:t>Canvas</a:t>
+              </a:r>
+              <a:endParaRPr lang="en-US" sz="2200" b="1" dirty="0"/>
+            </a:p>
+          </p:txBody>
+        </p:sp>
+        <p:sp>
+          <p:nvSpPr>
+            <p:cNvPr id="13" name="TextBox 12"/>
+            <p:cNvSpPr txBox="1"/>
+            <p:nvPr/>
+          </p:nvSpPr>
+          <p:spPr>
+            <a:xfrm>
+              <a:off x="762000" y="2743200"/>
+              <a:ext cx="1873398" cy="369332"/>
+            </a:xfrm>
+            <a:prstGeom prst="rect">
+              <a:avLst/>
+            </a:prstGeom>
+            <a:noFill/>
+          </p:spPr>
+          <p:txBody>
+            <a:bodyPr wrap="none" rtlCol="0">
+              <a:spAutoFit/>
+            </a:bodyPr>
+            <a:lstStyle/>
+            <a:p>
+              <a:r>
+                <a:rPr lang="en-US" dirty="0" err="1" smtClean="0"/>
+                <a:t>currentTool</a:t>
+              </a:r>
+              <a:r>
+                <a:rPr lang="en-US" dirty="0" smtClean="0"/>
+                <a:t>: Tool</a:t>
+              </a:r>
+            </a:p>
+          </p:txBody>
+        </p:sp>
+        <p:sp>
+          <p:nvSpPr>
+            <p:cNvPr id="15" name="Rectangle 14"/>
+            <p:cNvSpPr/>
+            <p:nvPr/>
+          </p:nvSpPr>
+          <p:spPr>
+            <a:xfrm>
+              <a:off x="4723041" y="1524000"/>
+              <a:ext cx="1981200" cy="2286000"/>
+            </a:xfrm>
+            <a:prstGeom prst="rect">
+              <a:avLst/>
+            </a:prstGeom>
+            <a:noFill/>
+            <a:ln>
+              <a:solidFill>
+                <a:schemeClr val="tx1"/>
+              </a:solidFill>
+            </a:ln>
+          </p:spPr>
+          <p:style>
+            <a:lnRef idx="2">
+              <a:schemeClr val="accent1">
+                <a:shade val="50000"/>
+              </a:schemeClr>
+            </a:lnRef>
+            <a:fillRef idx="1">
+              <a:schemeClr val="accent1"/>
+            </a:fillRef>
+            <a:effectRef idx="0">
+              <a:schemeClr val="accent1"/>
+            </a:effectRef>
+            <a:fontRef idx="minor">
+              <a:schemeClr val="lt1"/>
+            </a:fontRef>
+          </p:style>
+          <p:txBody>
+            <a:bodyPr rtlCol="0" anchor="ctr"/>
+            <a:lstStyle/>
+            <a:p>
+              <a:pPr algn="ctr"/>
+              <a:endParaRPr lang="en-US"/>
+            </a:p>
+          </p:txBody>
+        </p:sp>
+        <p:cxnSp>
+          <p:nvCxnSpPr>
+            <p:cNvPr id="16" name="Straight Connector 15"/>
+            <p:cNvCxnSpPr/>
+            <p:nvPr/>
+          </p:nvCxnSpPr>
+          <p:spPr>
+            <a:xfrm>
+              <a:off x="4723041" y="2057400"/>
+              <a:ext cx="1981200" cy="0"/>
+            </a:xfrm>
+            <a:prstGeom prst="line">
+              <a:avLst/>
+            </a:prstGeom>
+            <a:ln w="25400">
+              <a:solidFill>
+                <a:schemeClr val="tx1"/>
+              </a:solidFill>
+            </a:ln>
+          </p:spPr>
+          <p:style>
+            <a:lnRef idx="1">
+              <a:schemeClr val="accent1"/>
+            </a:lnRef>
+            <a:fillRef idx="0">
+              <a:schemeClr val="accent1"/>
+            </a:fillRef>
+            <a:effectRef idx="0">
+              <a:schemeClr val="accent1"/>
+            </a:effectRef>
+            <a:fontRef idx="minor">
+              <a:schemeClr val="tx1"/>
+            </a:fontRef>
+          </p:style>
+        </p:cxnSp>
+        <p:sp>
+          <p:nvSpPr>
+            <p:cNvPr id="17" name="TextBox 16"/>
+            <p:cNvSpPr txBox="1"/>
+            <p:nvPr/>
+          </p:nvSpPr>
+          <p:spPr>
+            <a:xfrm>
+              <a:off x="5334000" y="1575257"/>
+              <a:ext cx="761619" cy="430887"/>
+            </a:xfrm>
+            <a:prstGeom prst="rect">
+              <a:avLst/>
+            </a:prstGeom>
+            <a:noFill/>
+          </p:spPr>
+          <p:txBody>
+            <a:bodyPr wrap="none" rtlCol="0">
+              <a:spAutoFit/>
+            </a:bodyPr>
+            <a:lstStyle/>
+            <a:p>
+              <a:r>
+                <a:rPr lang="en-US" sz="2200" b="1" dirty="0" smtClean="0"/>
+                <a:t>Tool</a:t>
+              </a:r>
+              <a:endParaRPr lang="en-US" sz="2200" b="1" dirty="0"/>
+            </a:p>
+          </p:txBody>
+        </p:sp>
+        <p:cxnSp>
+          <p:nvCxnSpPr>
+            <p:cNvPr id="19" name="Straight Connector 18"/>
+            <p:cNvCxnSpPr/>
+            <p:nvPr/>
+          </p:nvCxnSpPr>
+          <p:spPr>
+            <a:xfrm>
+              <a:off x="4724400" y="2590800"/>
+              <a:ext cx="1981200" cy="0"/>
+            </a:xfrm>
+            <a:prstGeom prst="line">
+              <a:avLst/>
+            </a:prstGeom>
+            <a:ln w="25400">
+              <a:solidFill>
+                <a:schemeClr val="tx1"/>
+              </a:solidFill>
+            </a:ln>
+          </p:spPr>
+          <p:style>
+            <a:lnRef idx="1">
+              <a:schemeClr val="accent1"/>
+            </a:lnRef>
+            <a:fillRef idx="0">
+              <a:schemeClr val="accent1"/>
+            </a:fillRef>
+            <a:effectRef idx="0">
+              <a:schemeClr val="accent1"/>
+            </a:effectRef>
+            <a:fontRef idx="minor">
+              <a:schemeClr val="tx1"/>
+            </a:fontRef>
+          </p:style>
+        </p:cxnSp>
+        <p:sp>
+          <p:nvSpPr>
+            <p:cNvPr id="20" name="Diamond 19"/>
+            <p:cNvSpPr/>
+            <p:nvPr/>
+          </p:nvSpPr>
+          <p:spPr>
+            <a:xfrm>
+              <a:off x="2667000" y="2835610"/>
+              <a:ext cx="189141" cy="212390"/>
+            </a:xfrm>
+            <a:prstGeom prst="diamond">
+              <a:avLst/>
+            </a:prstGeom>
+            <a:noFill/>
+            <a:ln w="19050">
+              <a:solidFill>
+                <a:schemeClr val="tx1"/>
+              </a:solidFill>
+            </a:ln>
+          </p:spPr>
+          <p:style>
+            <a:lnRef idx="2">
+              <a:schemeClr val="accent1">
+                <a:shade val="50000"/>
+              </a:schemeClr>
+            </a:lnRef>
+            <a:fillRef idx="1">
+              <a:schemeClr val="accent1"/>
+            </a:fillRef>
+            <a:effectRef idx="0">
+              <a:schemeClr val="accent1"/>
+            </a:effectRef>
+            <a:fontRef idx="minor">
+              <a:schemeClr val="lt1"/>
+            </a:fontRef>
+          </p:style>
+          <p:txBody>
+            <a:bodyPr rtlCol="0" anchor="ctr"/>
+            <a:lstStyle/>
+            <a:p>
+              <a:pPr algn="ctr"/>
+              <a:endParaRPr lang="en-US"/>
+            </a:p>
+          </p:txBody>
+        </p:sp>
+        <p:sp>
+          <p:nvSpPr>
+            <p:cNvPr id="23" name="Rectangle 22"/>
+            <p:cNvSpPr/>
+            <p:nvPr/>
+          </p:nvSpPr>
+          <p:spPr>
+            <a:xfrm>
+              <a:off x="3200400" y="4495800"/>
+              <a:ext cx="1981200" cy="2286000"/>
+            </a:xfrm>
+            <a:prstGeom prst="rect">
+              <a:avLst/>
+            </a:prstGeom>
+            <a:noFill/>
+            <a:ln>
+              <a:solidFill>
+                <a:schemeClr val="tx1"/>
+              </a:solidFill>
+            </a:ln>
+          </p:spPr>
+          <p:style>
+            <a:lnRef idx="2">
+              <a:schemeClr val="accent1">
+                <a:shade val="50000"/>
+              </a:schemeClr>
+            </a:lnRef>
+            <a:fillRef idx="1">
+              <a:schemeClr val="accent1"/>
+            </a:fillRef>
+            <a:effectRef idx="0">
+              <a:schemeClr val="accent1"/>
+            </a:effectRef>
+            <a:fontRef idx="minor">
+              <a:schemeClr val="lt1"/>
+            </a:fontRef>
+          </p:style>
+          <p:txBody>
+            <a:bodyPr rtlCol="0" anchor="ctr"/>
+            <a:lstStyle/>
+            <a:p>
+              <a:pPr algn="ctr"/>
+              <a:endParaRPr lang="en-US"/>
+            </a:p>
+          </p:txBody>
+        </p:sp>
+        <p:cxnSp>
+          <p:nvCxnSpPr>
+            <p:cNvPr id="24" name="Straight Connector 23"/>
+            <p:cNvCxnSpPr/>
+            <p:nvPr/>
+          </p:nvCxnSpPr>
+          <p:spPr>
+            <a:xfrm>
+              <a:off x="3200400" y="5029200"/>
+              <a:ext cx="1981200" cy="0"/>
+            </a:xfrm>
+            <a:prstGeom prst="line">
+              <a:avLst/>
+            </a:prstGeom>
+            <a:ln w="25400">
+              <a:solidFill>
+                <a:schemeClr val="tx1"/>
+              </a:solidFill>
+            </a:ln>
+          </p:spPr>
+          <p:style>
+            <a:lnRef idx="1">
+              <a:schemeClr val="accent1"/>
+            </a:lnRef>
+            <a:fillRef idx="0">
+              <a:schemeClr val="accent1"/>
+            </a:fillRef>
+            <a:effectRef idx="0">
+              <a:schemeClr val="accent1"/>
+            </a:effectRef>
+            <a:fontRef idx="minor">
+              <a:schemeClr val="tx1"/>
+            </a:fontRef>
+          </p:style>
+        </p:cxnSp>
+        <p:sp>
+          <p:nvSpPr>
+            <p:cNvPr id="25" name="TextBox 24"/>
+            <p:cNvSpPr txBox="1"/>
+            <p:nvPr/>
+          </p:nvSpPr>
+          <p:spPr>
+            <a:xfrm>
+              <a:off x="3200400" y="4547057"/>
+              <a:ext cx="2018373" cy="430887"/>
+            </a:xfrm>
+            <a:prstGeom prst="rect">
+              <a:avLst/>
+            </a:prstGeom>
+            <a:noFill/>
+          </p:spPr>
+          <p:txBody>
+            <a:bodyPr wrap="none" rtlCol="0">
+              <a:spAutoFit/>
+            </a:bodyPr>
+            <a:lstStyle/>
+            <a:p>
+              <a:r>
+                <a:rPr lang="en-US" sz="2200" b="1" dirty="0" err="1" smtClean="0"/>
+                <a:t>SelectionTool</a:t>
+              </a:r>
+              <a:endParaRPr lang="en-US" sz="2200" b="1" dirty="0"/>
+            </a:p>
+          </p:txBody>
+        </p:sp>
+        <p:cxnSp>
+          <p:nvCxnSpPr>
+            <p:cNvPr id="27" name="Straight Connector 26"/>
+            <p:cNvCxnSpPr/>
+            <p:nvPr/>
+          </p:nvCxnSpPr>
+          <p:spPr>
+            <a:xfrm>
+              <a:off x="3201759" y="5562600"/>
+              <a:ext cx="1981200" cy="0"/>
+            </a:xfrm>
+            <a:prstGeom prst="line">
+              <a:avLst/>
+            </a:prstGeom>
+            <a:ln w="25400">
+              <a:solidFill>
+                <a:schemeClr val="tx1"/>
+              </a:solidFill>
+            </a:ln>
+          </p:spPr>
+          <p:style>
+            <a:lnRef idx="1">
+              <a:schemeClr val="accent1"/>
+            </a:lnRef>
+            <a:fillRef idx="0">
+              <a:schemeClr val="accent1"/>
+            </a:fillRef>
+            <a:effectRef idx="0">
+              <a:schemeClr val="accent1"/>
+            </a:effectRef>
+            <a:fontRef idx="minor">
+              <a:schemeClr val="tx1"/>
+            </a:fontRef>
+          </p:style>
+        </p:cxnSp>
+        <p:cxnSp>
+          <p:nvCxnSpPr>
+            <p:cNvPr id="47" name="Straight Arrow Connector 46"/>
+            <p:cNvCxnSpPr/>
+            <p:nvPr/>
+          </p:nvCxnSpPr>
+          <p:spPr>
+            <a:xfrm flipV="1">
+              <a:off x="2852370" y="2933701"/>
+              <a:ext cx="1872030" cy="11049"/>
+            </a:xfrm>
+            <a:prstGeom prst="straightConnector1">
+              <a:avLst/>
+            </a:prstGeom>
+            <a:ln w="28575">
+              <a:solidFill>
+                <a:schemeClr val="tx1"/>
+              </a:solidFill>
+              <a:tailEnd type="triangle"/>
+            </a:ln>
+          </p:spPr>
+          <p:style>
+            <a:lnRef idx="1">
+              <a:schemeClr val="accent1"/>
+            </a:lnRef>
+            <a:fillRef idx="0">
+              <a:schemeClr val="accent1"/>
+            </a:fillRef>
+            <a:effectRef idx="0">
+              <a:schemeClr val="accent1"/>
+            </a:effectRef>
+            <a:fontRef idx="minor">
+              <a:schemeClr val="tx1"/>
+            </a:fontRef>
+          </p:style>
+        </p:cxnSp>
+        <p:cxnSp>
+          <p:nvCxnSpPr>
+            <p:cNvPr id="56" name="Straight Connector 55"/>
+            <p:cNvCxnSpPr/>
+            <p:nvPr/>
+          </p:nvCxnSpPr>
+          <p:spPr>
+            <a:xfrm>
+              <a:off x="685800" y="3124200"/>
+              <a:ext cx="1981200" cy="0"/>
+            </a:xfrm>
+            <a:prstGeom prst="line">
+              <a:avLst/>
+            </a:prstGeom>
+            <a:ln w="25400">
+              <a:solidFill>
+                <a:schemeClr val="tx1"/>
+              </a:solidFill>
+            </a:ln>
+          </p:spPr>
+          <p:style>
+            <a:lnRef idx="1">
+              <a:schemeClr val="accent1"/>
+            </a:lnRef>
+            <a:fillRef idx="0">
+              <a:schemeClr val="accent1"/>
+            </a:fillRef>
+            <a:effectRef idx="0">
+              <a:schemeClr val="accent1"/>
+            </a:effectRef>
+            <a:fontRef idx="minor">
+              <a:schemeClr val="tx1"/>
+            </a:fontRef>
+          </p:style>
+        </p:cxnSp>
+        <p:sp>
+          <p:nvSpPr>
+            <p:cNvPr id="57" name="TextBox 56"/>
+            <p:cNvSpPr txBox="1"/>
+            <p:nvPr/>
+          </p:nvSpPr>
+          <p:spPr>
+            <a:xfrm>
+              <a:off x="762000" y="3124200"/>
+              <a:ext cx="1620957" cy="646331"/>
+            </a:xfrm>
+            <a:prstGeom prst="rect">
+              <a:avLst/>
+            </a:prstGeom>
+            <a:noFill/>
+          </p:spPr>
+          <p:txBody>
+            <a:bodyPr wrap="none" rtlCol="0">
+              <a:spAutoFit/>
+            </a:bodyPr>
+            <a:lstStyle/>
+            <a:p>
+              <a:r>
+                <a:rPr lang="en-US" dirty="0" err="1" smtClean="0"/>
+                <a:t>mouseDown</a:t>
+              </a:r>
+              <a:r>
+                <a:rPr lang="en-US" dirty="0" smtClean="0"/>
+                <a:t>()</a:t>
+              </a:r>
+            </a:p>
+            <a:p>
+              <a:r>
+                <a:rPr lang="en-US" dirty="0" err="1" smtClean="0"/>
+                <a:t>mouseUp</a:t>
+              </a:r>
+              <a:r>
+                <a:rPr lang="en-US" dirty="0" smtClean="0"/>
+                <a:t>()</a:t>
+              </a:r>
+              <a:endParaRPr lang="en-US" dirty="0"/>
+            </a:p>
+          </p:txBody>
+        </p:sp>
+        <p:sp>
+          <p:nvSpPr>
+            <p:cNvPr id="58" name="TextBox 57"/>
+            <p:cNvSpPr txBox="1"/>
+            <p:nvPr/>
+          </p:nvSpPr>
+          <p:spPr>
+            <a:xfrm>
+              <a:off x="1077517" y="1666102"/>
+              <a:ext cx="1043876" cy="369332"/>
+            </a:xfrm>
+            <a:prstGeom prst="rect">
+              <a:avLst/>
+            </a:prstGeom>
+            <a:noFill/>
+          </p:spPr>
+          <p:txBody>
+            <a:bodyPr wrap="none" rtlCol="0">
+              <a:spAutoFit/>
+            </a:bodyPr>
+            <a:lstStyle/>
+            <a:p>
+              <a:r>
+                <a:rPr lang="en-US" b="1" dirty="0" smtClean="0">
+                  <a:solidFill>
+                    <a:srgbClr val="FF0000"/>
+                  </a:solidFill>
+                </a:rPr>
+                <a:t>Context</a:t>
+              </a:r>
+              <a:endParaRPr lang="en-US" b="1" dirty="0">
+                <a:solidFill>
+                  <a:srgbClr val="FF0000"/>
+                </a:solidFill>
+              </a:endParaRPr>
+            </a:p>
+          </p:txBody>
+        </p:sp>
+        <p:sp>
+          <p:nvSpPr>
+            <p:cNvPr id="61" name="TextBox 60"/>
+            <p:cNvSpPr txBox="1"/>
+            <p:nvPr/>
+          </p:nvSpPr>
+          <p:spPr>
+            <a:xfrm>
+              <a:off x="5110266" y="1171988"/>
+              <a:ext cx="748923" cy="369332"/>
+            </a:xfrm>
+            <a:prstGeom prst="rect">
+              <a:avLst/>
+            </a:prstGeom>
+            <a:noFill/>
+          </p:spPr>
+          <p:txBody>
+            <a:bodyPr wrap="none" rtlCol="0">
+              <a:spAutoFit/>
+            </a:bodyPr>
+            <a:lstStyle/>
+            <a:p>
+              <a:r>
+                <a:rPr lang="en-US" b="1" dirty="0" smtClean="0">
+                  <a:solidFill>
+                    <a:srgbClr val="FF0000"/>
+                  </a:solidFill>
+                </a:rPr>
+                <a:t>State</a:t>
+              </a:r>
+              <a:endParaRPr lang="en-US" b="1" dirty="0">
+                <a:solidFill>
+                  <a:srgbClr val="FF0000"/>
+                </a:solidFill>
+              </a:endParaRPr>
+            </a:p>
+          </p:txBody>
+        </p:sp>
+        <p:sp>
+          <p:nvSpPr>
+            <p:cNvPr id="62" name="TextBox 61"/>
+            <p:cNvSpPr txBox="1"/>
+            <p:nvPr/>
+          </p:nvSpPr>
+          <p:spPr>
+            <a:xfrm>
+              <a:off x="2015460" y="5377934"/>
+              <a:ext cx="1184940" cy="646331"/>
+            </a:xfrm>
+            <a:prstGeom prst="rect">
+              <a:avLst/>
+            </a:prstGeom>
+            <a:noFill/>
+          </p:spPr>
+          <p:txBody>
+            <a:bodyPr wrap="none" rtlCol="0">
+              <a:spAutoFit/>
+            </a:bodyPr>
+            <a:lstStyle/>
+            <a:p>
+              <a:r>
+                <a:rPr lang="en-US" b="1" dirty="0" smtClean="0">
+                  <a:solidFill>
+                    <a:srgbClr val="FF0000"/>
+                  </a:solidFill>
+                </a:rPr>
+                <a:t>Concrete</a:t>
+              </a:r>
+            </a:p>
+            <a:p>
+              <a:r>
+                <a:rPr lang="en-US" b="1" dirty="0" err="1" smtClean="0">
+                  <a:solidFill>
+                    <a:srgbClr val="FF0000"/>
+                  </a:solidFill>
+                </a:rPr>
+                <a:t>StateA</a:t>
+              </a:r>
+              <a:endParaRPr lang="en-US" b="1" dirty="0">
+                <a:solidFill>
+                  <a:srgbClr val="FF0000"/>
+                </a:solidFill>
+              </a:endParaRPr>
+            </a:p>
+          </p:txBody>
+        </p:sp>
+        <p:cxnSp>
+          <p:nvCxnSpPr>
+            <p:cNvPr id="14" name="Straight Arrow Connector 13"/>
+            <p:cNvCxnSpPr>
+              <a:endCxn id="15" idx="2"/>
+            </p:cNvCxnSpPr>
+            <p:nvPr/>
+          </p:nvCxnSpPr>
+          <p:spPr>
+            <a:xfrm flipV="1">
+              <a:off x="5709148" y="3810000"/>
+              <a:ext cx="4493" cy="342900"/>
+            </a:xfrm>
+            <a:prstGeom prst="straightConnector1">
+              <a:avLst/>
+            </a:prstGeom>
+            <a:ln w="28575">
+              <a:solidFill>
+                <a:schemeClr val="tx1"/>
+              </a:solidFill>
+              <a:tailEnd type="triangle"/>
+            </a:ln>
+          </p:spPr>
+          <p:style>
+            <a:lnRef idx="1">
+              <a:schemeClr val="accent1"/>
+            </a:lnRef>
+            <a:fillRef idx="0">
+              <a:schemeClr val="accent1"/>
+            </a:fillRef>
+            <a:effectRef idx="0">
+              <a:schemeClr val="accent1"/>
+            </a:effectRef>
+            <a:fontRef idx="minor">
+              <a:schemeClr val="tx1"/>
+            </a:fontRef>
+          </p:style>
+        </p:cxnSp>
+        <p:cxnSp>
+          <p:nvCxnSpPr>
+            <p:cNvPr id="38" name="Straight Connector 37"/>
+            <p:cNvCxnSpPr/>
+            <p:nvPr/>
+          </p:nvCxnSpPr>
+          <p:spPr>
+            <a:xfrm flipH="1">
+              <a:off x="4191000" y="4152900"/>
+              <a:ext cx="1518148" cy="0"/>
+            </a:xfrm>
+            <a:prstGeom prst="line">
+              <a:avLst/>
+            </a:prstGeom>
+            <a:ln w="28575">
+              <a:solidFill>
+                <a:schemeClr val="tx1"/>
+              </a:solidFill>
+            </a:ln>
+          </p:spPr>
+          <p:style>
+            <a:lnRef idx="1">
+              <a:schemeClr val="accent1"/>
+            </a:lnRef>
+            <a:fillRef idx="0">
+              <a:schemeClr val="accent1"/>
+            </a:fillRef>
+            <a:effectRef idx="0">
+              <a:schemeClr val="accent1"/>
+            </a:effectRef>
+            <a:fontRef idx="minor">
+              <a:schemeClr val="tx1"/>
+            </a:fontRef>
+          </p:style>
+        </p:cxnSp>
+        <p:cxnSp>
+          <p:nvCxnSpPr>
+            <p:cNvPr id="40" name="Straight Connector 39"/>
+            <p:cNvCxnSpPr/>
+            <p:nvPr/>
+          </p:nvCxnSpPr>
+          <p:spPr>
+            <a:xfrm>
+              <a:off x="4191000" y="4152900"/>
+              <a:ext cx="0" cy="342900"/>
+            </a:xfrm>
+            <a:prstGeom prst="line">
+              <a:avLst/>
+            </a:prstGeom>
+            <a:ln w="28575">
+              <a:solidFill>
+                <a:schemeClr val="tx1"/>
+              </a:solidFill>
+            </a:ln>
+          </p:spPr>
+          <p:style>
+            <a:lnRef idx="1">
+              <a:schemeClr val="accent1"/>
+            </a:lnRef>
+            <a:fillRef idx="0">
+              <a:schemeClr val="accent1"/>
+            </a:fillRef>
+            <a:effectRef idx="0">
+              <a:schemeClr val="accent1"/>
+            </a:effectRef>
+            <a:fontRef idx="minor">
+              <a:schemeClr val="tx1"/>
+            </a:fontRef>
+          </p:style>
+        </p:cxnSp>
+        <p:sp>
+          <p:nvSpPr>
+            <p:cNvPr id="51" name="TextBox 50"/>
+            <p:cNvSpPr txBox="1"/>
+            <p:nvPr/>
+          </p:nvSpPr>
+          <p:spPr>
+            <a:xfrm>
+              <a:off x="4876800" y="2579012"/>
+              <a:ext cx="1620957" cy="646331"/>
+            </a:xfrm>
+            <a:prstGeom prst="rect">
+              <a:avLst/>
+            </a:prstGeom>
+            <a:noFill/>
+          </p:spPr>
+          <p:txBody>
+            <a:bodyPr wrap="none" rtlCol="0">
+              <a:spAutoFit/>
+            </a:bodyPr>
+            <a:lstStyle/>
+            <a:p>
+              <a:r>
+                <a:rPr lang="en-US" dirty="0" err="1" smtClean="0"/>
+                <a:t>mouseDown</a:t>
+              </a:r>
+              <a:r>
+                <a:rPr lang="en-US" dirty="0" smtClean="0"/>
+                <a:t>()</a:t>
+              </a:r>
+            </a:p>
+            <a:p>
+              <a:r>
+                <a:rPr lang="en-US" dirty="0" err="1" smtClean="0"/>
+                <a:t>mouseUp</a:t>
+              </a:r>
+              <a:r>
+                <a:rPr lang="en-US" dirty="0" smtClean="0"/>
+                <a:t>()</a:t>
+              </a:r>
+              <a:endParaRPr lang="en-US" dirty="0"/>
+            </a:p>
+          </p:txBody>
+        </p:sp>
+        <p:cxnSp>
+          <p:nvCxnSpPr>
+            <p:cNvPr id="52" name="Straight Connector 51"/>
+            <p:cNvCxnSpPr/>
+            <p:nvPr/>
+          </p:nvCxnSpPr>
+          <p:spPr>
+            <a:xfrm flipH="1">
+              <a:off x="5738683" y="4152900"/>
+              <a:ext cx="1500317" cy="0"/>
+            </a:xfrm>
+            <a:prstGeom prst="line">
+              <a:avLst/>
+            </a:prstGeom>
+            <a:ln w="28575">
+              <a:solidFill>
+                <a:schemeClr val="tx1"/>
+              </a:solidFill>
+            </a:ln>
+          </p:spPr>
+          <p:style>
+            <a:lnRef idx="1">
+              <a:schemeClr val="accent1"/>
+            </a:lnRef>
+            <a:fillRef idx="0">
+              <a:schemeClr val="accent1"/>
+            </a:fillRef>
+            <a:effectRef idx="0">
+              <a:schemeClr val="accent1"/>
+            </a:effectRef>
+            <a:fontRef idx="minor">
+              <a:schemeClr val="tx1"/>
+            </a:fontRef>
+          </p:style>
+        </p:cxnSp>
+        <p:cxnSp>
+          <p:nvCxnSpPr>
+            <p:cNvPr id="53" name="Straight Connector 52"/>
+            <p:cNvCxnSpPr/>
+            <p:nvPr/>
+          </p:nvCxnSpPr>
+          <p:spPr>
+            <a:xfrm>
+              <a:off x="7239000" y="4152900"/>
+              <a:ext cx="0" cy="342900"/>
+            </a:xfrm>
+            <a:prstGeom prst="line">
+              <a:avLst/>
+            </a:prstGeom>
+            <a:ln w="28575">
+              <a:solidFill>
+                <a:schemeClr val="tx1"/>
+              </a:solidFill>
+            </a:ln>
+          </p:spPr>
+          <p:style>
+            <a:lnRef idx="1">
+              <a:schemeClr val="accent1"/>
+            </a:lnRef>
+            <a:fillRef idx="0">
+              <a:schemeClr val="accent1"/>
+            </a:fillRef>
+            <a:effectRef idx="0">
+              <a:schemeClr val="accent1"/>
+            </a:effectRef>
+            <a:fontRef idx="minor">
+              <a:schemeClr val="tx1"/>
+            </a:fontRef>
+          </p:style>
+        </p:cxnSp>
+        <p:sp>
+          <p:nvSpPr>
+            <p:cNvPr id="59" name="Rectangle 58"/>
+            <p:cNvSpPr/>
+            <p:nvPr/>
+          </p:nvSpPr>
+          <p:spPr>
+            <a:xfrm>
+              <a:off x="5791200" y="4495800"/>
+              <a:ext cx="1981200" cy="2286000"/>
+            </a:xfrm>
+            <a:prstGeom prst="rect">
+              <a:avLst/>
+            </a:prstGeom>
+            <a:noFill/>
+            <a:ln>
+              <a:solidFill>
+                <a:schemeClr val="tx1"/>
+              </a:solidFill>
+            </a:ln>
+          </p:spPr>
+          <p:style>
+            <a:lnRef idx="2">
+              <a:schemeClr val="accent1">
+                <a:shade val="50000"/>
+              </a:schemeClr>
+            </a:lnRef>
+            <a:fillRef idx="1">
+              <a:schemeClr val="accent1"/>
+            </a:fillRef>
+            <a:effectRef idx="0">
+              <a:schemeClr val="accent1"/>
+            </a:effectRef>
+            <a:fontRef idx="minor">
+              <a:schemeClr val="lt1"/>
+            </a:fontRef>
+          </p:style>
+          <p:txBody>
+            <a:bodyPr rtlCol="0" anchor="ctr"/>
+            <a:lstStyle/>
+            <a:p>
+              <a:pPr algn="ctr"/>
+              <a:endParaRPr lang="en-US"/>
+            </a:p>
+          </p:txBody>
+        </p:sp>
+        <p:cxnSp>
+          <p:nvCxnSpPr>
+            <p:cNvPr id="60" name="Straight Connector 59"/>
+            <p:cNvCxnSpPr/>
+            <p:nvPr/>
+          </p:nvCxnSpPr>
+          <p:spPr>
+            <a:xfrm>
+              <a:off x="5791200" y="5029200"/>
+              <a:ext cx="1981200" cy="0"/>
+            </a:xfrm>
+            <a:prstGeom prst="line">
+              <a:avLst/>
+            </a:prstGeom>
+            <a:ln w="25400">
+              <a:solidFill>
+                <a:schemeClr val="tx1"/>
+              </a:solidFill>
+            </a:ln>
+          </p:spPr>
+          <p:style>
+            <a:lnRef idx="1">
+              <a:schemeClr val="accent1"/>
+            </a:lnRef>
+            <a:fillRef idx="0">
+              <a:schemeClr val="accent1"/>
+            </a:fillRef>
+            <a:effectRef idx="0">
+              <a:schemeClr val="accent1"/>
+            </a:effectRef>
+            <a:fontRef idx="minor">
+              <a:schemeClr val="tx1"/>
+            </a:fontRef>
+          </p:style>
+        </p:cxnSp>
+        <p:sp>
+          <p:nvSpPr>
+            <p:cNvPr id="63" name="TextBox 62"/>
+            <p:cNvSpPr txBox="1"/>
+            <p:nvPr/>
+          </p:nvSpPr>
+          <p:spPr>
+            <a:xfrm>
+              <a:off x="6019800" y="4547057"/>
+              <a:ext cx="1577548" cy="430887"/>
+            </a:xfrm>
+            <a:prstGeom prst="rect">
+              <a:avLst/>
+            </a:prstGeom>
+            <a:noFill/>
+          </p:spPr>
+          <p:txBody>
+            <a:bodyPr wrap="none" rtlCol="0">
+              <a:spAutoFit/>
+            </a:bodyPr>
+            <a:lstStyle/>
+            <a:p>
+              <a:r>
+                <a:rPr lang="en-US" sz="2200" b="1" dirty="0" err="1" smtClean="0"/>
+                <a:t>BrushTool</a:t>
+              </a:r>
+              <a:endParaRPr lang="en-US" sz="2200" b="1" dirty="0"/>
+            </a:p>
+          </p:txBody>
+        </p:sp>
+        <p:cxnSp>
+          <p:nvCxnSpPr>
+            <p:cNvPr id="65" name="Straight Connector 64"/>
+            <p:cNvCxnSpPr/>
+            <p:nvPr/>
+          </p:nvCxnSpPr>
+          <p:spPr>
+            <a:xfrm>
+              <a:off x="5792559" y="5562600"/>
+              <a:ext cx="1981200" cy="0"/>
+            </a:xfrm>
+            <a:prstGeom prst="line">
+              <a:avLst/>
+            </a:prstGeom>
+            <a:ln w="25400">
+              <a:solidFill>
+                <a:schemeClr val="tx1"/>
+              </a:solidFill>
+            </a:ln>
+          </p:spPr>
+          <p:style>
+            <a:lnRef idx="1">
+              <a:schemeClr val="accent1"/>
+            </a:lnRef>
+            <a:fillRef idx="0">
+              <a:schemeClr val="accent1"/>
+            </a:fillRef>
+            <a:effectRef idx="0">
+              <a:schemeClr val="accent1"/>
+            </a:effectRef>
+            <a:fontRef idx="minor">
+              <a:schemeClr val="tx1"/>
+            </a:fontRef>
+          </p:style>
+        </p:cxnSp>
+        <p:sp>
+          <p:nvSpPr>
+            <p:cNvPr id="68" name="TextBox 67"/>
+            <p:cNvSpPr txBox="1"/>
+            <p:nvPr/>
+          </p:nvSpPr>
+          <p:spPr>
+            <a:xfrm>
+              <a:off x="7806660" y="5373469"/>
+              <a:ext cx="1184940" cy="646331"/>
+            </a:xfrm>
+            <a:prstGeom prst="rect">
+              <a:avLst/>
+            </a:prstGeom>
+            <a:noFill/>
+          </p:spPr>
+          <p:txBody>
+            <a:bodyPr wrap="none" rtlCol="0">
+              <a:spAutoFit/>
+            </a:bodyPr>
+            <a:lstStyle/>
+            <a:p>
+              <a:r>
+                <a:rPr lang="en-US" b="1" dirty="0" smtClean="0">
+                  <a:solidFill>
+                    <a:srgbClr val="FF0000"/>
+                  </a:solidFill>
+                </a:rPr>
+                <a:t>Concrete</a:t>
+              </a:r>
+            </a:p>
+            <a:p>
+              <a:r>
+                <a:rPr lang="en-US" b="1" dirty="0" err="1" smtClean="0">
+                  <a:solidFill>
+                    <a:srgbClr val="FF0000"/>
+                  </a:solidFill>
+                </a:rPr>
+                <a:t>StateB</a:t>
+              </a:r>
+              <a:endParaRPr lang="en-US" b="1" dirty="0">
+                <a:solidFill>
+                  <a:srgbClr val="FF0000"/>
+                </a:solidFill>
+              </a:endParaRPr>
+            </a:p>
+          </p:txBody>
+        </p:sp>
+        <p:sp>
+          <p:nvSpPr>
+            <p:cNvPr id="69" name="TextBox 68"/>
+            <p:cNvSpPr txBox="1"/>
+            <p:nvPr/>
+          </p:nvSpPr>
+          <p:spPr>
+            <a:xfrm>
+              <a:off x="5791200" y="5562600"/>
+              <a:ext cx="1620957" cy="646331"/>
+            </a:xfrm>
+            <a:prstGeom prst="rect">
+              <a:avLst/>
+            </a:prstGeom>
+            <a:noFill/>
+          </p:spPr>
+          <p:txBody>
+            <a:bodyPr wrap="none" rtlCol="0">
+              <a:spAutoFit/>
+            </a:bodyPr>
+            <a:lstStyle/>
+            <a:p>
+              <a:r>
+                <a:rPr lang="en-US" dirty="0" err="1" smtClean="0"/>
+                <a:t>mouseDown</a:t>
+              </a:r>
+              <a:r>
+                <a:rPr lang="en-US" dirty="0" smtClean="0"/>
+                <a:t>()</a:t>
+              </a:r>
+            </a:p>
+            <a:p>
+              <a:r>
+                <a:rPr lang="en-US" dirty="0" err="1" smtClean="0"/>
+                <a:t>mouseUp</a:t>
+              </a:r>
+              <a:r>
+                <a:rPr lang="en-US" dirty="0" smtClean="0"/>
+                <a:t>()</a:t>
+              </a:r>
+              <a:endParaRPr lang="en-US" dirty="0"/>
+            </a:p>
+          </p:txBody>
+        </p:sp>
+        <p:sp>
+          <p:nvSpPr>
+            <p:cNvPr id="70" name="TextBox 69"/>
+            <p:cNvSpPr txBox="1"/>
+            <p:nvPr/>
+          </p:nvSpPr>
+          <p:spPr>
+            <a:xfrm>
+              <a:off x="3200400" y="5562600"/>
+              <a:ext cx="1620957" cy="646331"/>
+            </a:xfrm>
+            <a:prstGeom prst="rect">
+              <a:avLst/>
+            </a:prstGeom>
+            <a:noFill/>
+          </p:spPr>
+          <p:txBody>
+            <a:bodyPr wrap="none" rtlCol="0">
+              <a:spAutoFit/>
+            </a:bodyPr>
+            <a:lstStyle/>
+            <a:p>
+              <a:r>
+                <a:rPr lang="en-US" dirty="0" err="1" smtClean="0"/>
+                <a:t>mouseDown</a:t>
+              </a:r>
+              <a:r>
+                <a:rPr lang="en-US" dirty="0" smtClean="0"/>
+                <a:t>()</a:t>
+              </a:r>
+            </a:p>
+            <a:p>
+              <a:r>
+                <a:rPr lang="en-US" dirty="0" err="1" smtClean="0"/>
+                <a:t>mouseUp</a:t>
+              </a:r>
+              <a:r>
+                <a:rPr lang="en-US" dirty="0" smtClean="0"/>
+                <a:t>()</a:t>
+              </a:r>
+              <a:endParaRPr lang="en-US" dirty="0"/>
+            </a:p>
+          </p:txBody>
+        </p:sp>
+      </p:grpSp>
+    </p:spTree>
+    <p:extLst>
+      <p:ext uri="{BB962C8B-B14F-4D97-AF65-F5344CB8AC3E}">
+        <p14:creationId xmlns:p14="http://schemas.microsoft.com/office/powerpoint/2010/main" val="869890538"/>
       </p:ext>
     </p:extLst>
   </p:cSld>

</xml_diff>